<commit_message>
Avancees ppt, add variance
</commit_message>
<xml_diff>
--- a/Présentation.pptx
+++ b/Présentation.pptx
@@ -5,7 +5,7 @@
     <p:sldMasterId id="2147483648" r:id="rId1"/>
   </p:sldMasterIdLst>
   <p:notesMasterIdLst>
-    <p:notesMasterId r:id="rId33"/>
+    <p:notesMasterId r:id="rId38"/>
   </p:notesMasterIdLst>
   <p:sldIdLst>
     <p:sldId id="257" r:id="rId2"/>
@@ -37,8 +37,13 @@
     <p:sldId id="335" r:id="rId28"/>
     <p:sldId id="311" r:id="rId29"/>
     <p:sldId id="317" r:id="rId30"/>
-    <p:sldId id="318" r:id="rId31"/>
-    <p:sldId id="297" r:id="rId32"/>
+    <p:sldId id="339" r:id="rId31"/>
+    <p:sldId id="318" r:id="rId32"/>
+    <p:sldId id="297" r:id="rId33"/>
+    <p:sldId id="342" r:id="rId34"/>
+    <p:sldId id="340" r:id="rId35"/>
+    <p:sldId id="341" r:id="rId36"/>
+    <p:sldId id="343" r:id="rId37"/>
   </p:sldIdLst>
   <p:sldSz cx="12192000" cy="6858000"/>
   <p:notesSz cx="6858000" cy="9144000"/>
@@ -227,7 +232,7 @@
           <a:p>
             <a:fld id="{500DDC09-334D-4A7D-989D-E7D77A3D2287}" type="datetimeFigureOut">
               <a:rPr lang="fr-FR" smtClean="0"/>
-              <a:t>02/07/2019</a:t>
+              <a:t>01/08/2019</a:t>
             </a:fld>
             <a:endParaRPr lang="fr-FR"/>
           </a:p>
@@ -3133,7 +3138,33 @@
           <a:bodyPr/>
           <a:lstStyle/>
           <a:p>
+            <a:r>
+              <a:rPr lang="fr-FR" dirty="0"/>
+              <a:t>Regardons d’abord la </a:t>
+            </a:r>
+            <a:r>
+              <a:rPr lang="fr-FR" dirty="0" err="1"/>
+              <a:t>boxplot</a:t>
+            </a:r>
+            <a:r>
+              <a:rPr lang="fr-FR" dirty="0"/>
+              <a:t> sur un échantillon de 10 pays au hasard ; </a:t>
+            </a:r>
+          </a:p>
+          <a:p>
             <a:endParaRPr lang="fr-FR" dirty="0"/>
+          </a:p>
+          <a:p>
+            <a:r>
+              <a:rPr lang="fr-FR" dirty="0"/>
+              <a:t>On voit ici que le pays semble bien avoir un impact sur le revenu moyen. Vérifions ça par calcul</a:t>
+            </a:r>
+          </a:p>
+          <a:p>
+            <a:r>
+              <a:rPr lang="fr-FR" dirty="0"/>
+              <a:t>[CLICK]</a:t>
+            </a:r>
           </a:p>
         </p:txBody>
       </p:sp>
@@ -3217,7 +3248,66 @@
           <a:bodyPr/>
           <a:lstStyle/>
           <a:p>
+            <a:r>
+              <a:rPr lang="fr-FR" dirty="0"/>
+              <a:t>On utilise la commande </a:t>
+            </a:r>
+            <a:r>
+              <a:rPr lang="fr-FR" dirty="0" err="1"/>
+              <a:t>smf.ols</a:t>
+            </a:r>
+            <a:r>
+              <a:rPr lang="fr-FR" dirty="0"/>
+              <a:t> pour l’</a:t>
+            </a:r>
+            <a:r>
+              <a:rPr lang="fr-FR" dirty="0" err="1"/>
+              <a:t>anova</a:t>
+            </a:r>
+            <a:r>
+              <a:rPr lang="fr-FR" dirty="0"/>
+              <a:t> ; On va ici regarder la variable « </a:t>
+            </a:r>
+            <a:r>
+              <a:rPr lang="fr-FR" dirty="0" err="1"/>
+              <a:t>Income</a:t>
+            </a:r>
+            <a:r>
+              <a:rPr lang="fr-FR" dirty="0"/>
+              <a:t> » avec comme variable descriptive « Code »</a:t>
+            </a:r>
+          </a:p>
+          <a:p>
             <a:endParaRPr lang="fr-FR" dirty="0"/>
+          </a:p>
+          <a:p>
+            <a:r>
+              <a:rPr lang="fr-FR" dirty="0"/>
+              <a:t>[CLICK]</a:t>
+            </a:r>
+          </a:p>
+          <a:p>
+            <a:endParaRPr lang="fr-FR" dirty="0"/>
+          </a:p>
+          <a:p>
+            <a:r>
+              <a:rPr lang="fr-FR" dirty="0"/>
+              <a:t>Voici le début du </a:t>
+            </a:r>
+            <a:r>
+              <a:rPr lang="fr-FR" dirty="0" err="1"/>
+              <a:t>summary</a:t>
+            </a:r>
+            <a:r>
+              <a:rPr lang="fr-FR" dirty="0"/>
+              <a:t> de l’ANOVA ;</a:t>
+            </a:r>
+          </a:p>
+          <a:p>
+            <a:r>
+              <a:rPr lang="fr-FR" dirty="0"/>
+              <a:t>On voit que la P-valeur est à 0, on peut donc en déduire que le pays a bien une influence sur le revenu</a:t>
+            </a:r>
           </a:p>
         </p:txBody>
       </p:sp>
@@ -3247,7 +3337,7 @@
     </p:spTree>
     <p:extLst>
       <p:ext uri="{BB962C8B-B14F-4D97-AF65-F5344CB8AC3E}">
-        <p14:creationId xmlns:p14="http://schemas.microsoft.com/office/powerpoint/2010/main" val="707866840"/>
+        <p14:creationId xmlns:p14="http://schemas.microsoft.com/office/powerpoint/2010/main" val="3388801551"/>
       </p:ext>
     </p:extLst>
   </p:cSld>
@@ -3415,7 +3505,10 @@
           <a:bodyPr/>
           <a:lstStyle/>
           <a:p>
-            <a:endParaRPr lang="fr-FR" dirty="0"/>
+            <a:r>
+              <a:rPr lang="fr-FR" dirty="0"/>
+              <a:t>On voit sur cette régression que l'indice de Gini n'est pas significatif, on peut donc l'enlever</a:t>
+            </a:r>
           </a:p>
         </p:txBody>
       </p:sp>
@@ -3445,7 +3538,637 @@
     </p:spTree>
     <p:extLst>
       <p:ext uri="{BB962C8B-B14F-4D97-AF65-F5344CB8AC3E}">
+        <p14:creationId xmlns:p14="http://schemas.microsoft.com/office/powerpoint/2010/main" val="707866840"/>
+      </p:ext>
+    </p:extLst>
+  </p:cSld>
+  <p:clrMapOvr>
+    <a:masterClrMapping/>
+  </p:clrMapOvr>
+</p:notes>
+</file>
+
+<file path=ppt/notesSlides/notesSlide31.xml><?xml version="1.0" encoding="utf-8"?>
+<p:notes xmlns:a="http://schemas.openxmlformats.org/drawingml/2006/main" xmlns:r="http://schemas.openxmlformats.org/officeDocument/2006/relationships" xmlns:p="http://schemas.openxmlformats.org/presentationml/2006/main">
+  <p:cSld>
+    <p:spTree>
+      <p:nvGrpSpPr>
+        <p:cNvPr id="1" name=""/>
+        <p:cNvGrpSpPr/>
+        <p:nvPr/>
+      </p:nvGrpSpPr>
+      <p:grpSpPr>
+        <a:xfrm>
+          <a:off x="0" y="0"/>
+          <a:ext cx="0" cy="0"/>
+          <a:chOff x="0" y="0"/>
+          <a:chExt cx="0" cy="0"/>
+        </a:xfrm>
+      </p:grpSpPr>
+      <p:sp>
+        <p:nvSpPr>
+          <p:cNvPr id="2" name="Espace réservé de l'image des diapositives 1"/>
+          <p:cNvSpPr>
+            <a:spLocks noGrp="1" noRot="1" noChangeAspect="1"/>
+          </p:cNvSpPr>
+          <p:nvPr>
+            <p:ph type="sldImg"/>
+          </p:nvPr>
+        </p:nvSpPr>
+        <p:spPr/>
+      </p:sp>
+      <p:sp>
+        <p:nvSpPr>
+          <p:cNvPr id="3" name="Espace réservé des notes 2"/>
+          <p:cNvSpPr>
+            <a:spLocks noGrp="1"/>
+          </p:cNvSpPr>
+          <p:nvPr>
+            <p:ph type="body" idx="1"/>
+          </p:nvPr>
+        </p:nvSpPr>
+        <p:spPr/>
+        <p:txBody>
+          <a:bodyPr/>
+          <a:lstStyle/>
+          <a:p>
+            <a:r>
+              <a:rPr lang="fr-FR" dirty="0"/>
+              <a:t>Le paramètre est ici significatif, et on obtient un R-</a:t>
+            </a:r>
+            <a:r>
+              <a:rPr lang="fr-FR" dirty="0" err="1"/>
+              <a:t>squared</a:t>
+            </a:r>
+            <a:r>
+              <a:rPr lang="fr-FR" dirty="0"/>
+              <a:t> de 0.445 </a:t>
+            </a:r>
+          </a:p>
+          <a:p>
+            <a:r>
+              <a:rPr lang="fr-FR" dirty="0"/>
+              <a:t>R² = SCE/SCT ; </a:t>
+            </a:r>
+          </a:p>
+          <a:p>
+            <a:r>
+              <a:rPr lang="fr-FR" dirty="0"/>
+              <a:t>La décomposition de variance totale expliquée pour le pays de naissance est donc égale à 0.445 </a:t>
+            </a:r>
+          </a:p>
+          <a:p>
+            <a:r>
+              <a:rPr lang="fr-FR" dirty="0"/>
+              <a:t>Et pour les autres facteurs, on a 1-0.445 = 0.555 </a:t>
+            </a:r>
+          </a:p>
+          <a:p>
+            <a:endParaRPr lang="fr-FR" dirty="0"/>
+          </a:p>
+        </p:txBody>
+      </p:sp>
+      <p:sp>
+        <p:nvSpPr>
+          <p:cNvPr id="4" name="Espace réservé du numéro de diapositive 3"/>
+          <p:cNvSpPr>
+            <a:spLocks noGrp="1"/>
+          </p:cNvSpPr>
+          <p:nvPr>
+            <p:ph type="sldNum" sz="quarter" idx="5"/>
+          </p:nvPr>
+        </p:nvSpPr>
+        <p:spPr/>
+        <p:txBody>
+          <a:bodyPr/>
+          <a:lstStyle/>
+          <a:p>
+            <a:fld id="{F44DFA25-216B-4048-9E14-17772AFFB9C9}" type="slidenum">
+              <a:rPr lang="fr-FR" smtClean="0"/>
+              <a:t>32</a:t>
+            </a:fld>
+            <a:endParaRPr lang="fr-FR"/>
+          </a:p>
+        </p:txBody>
+      </p:sp>
+    </p:spTree>
+    <p:extLst>
+      <p:ext uri="{BB962C8B-B14F-4D97-AF65-F5344CB8AC3E}">
         <p14:creationId xmlns:p14="http://schemas.microsoft.com/office/powerpoint/2010/main" val="51407293"/>
+      </p:ext>
+    </p:extLst>
+  </p:cSld>
+  <p:clrMapOvr>
+    <a:masterClrMapping/>
+  </p:clrMapOvr>
+</p:notes>
+</file>
+
+<file path=ppt/notesSlides/notesSlide32.xml><?xml version="1.0" encoding="utf-8"?>
+<p:notes xmlns:a="http://schemas.openxmlformats.org/drawingml/2006/main" xmlns:r="http://schemas.openxmlformats.org/officeDocument/2006/relationships" xmlns:p="http://schemas.openxmlformats.org/presentationml/2006/main">
+  <p:cSld>
+    <p:spTree>
+      <p:nvGrpSpPr>
+        <p:cNvPr id="1" name=""/>
+        <p:cNvGrpSpPr/>
+        <p:nvPr/>
+      </p:nvGrpSpPr>
+      <p:grpSpPr>
+        <a:xfrm>
+          <a:off x="0" y="0"/>
+          <a:ext cx="0" cy="0"/>
+          <a:chOff x="0" y="0"/>
+          <a:chExt cx="0" cy="0"/>
+        </a:xfrm>
+      </p:grpSpPr>
+      <p:sp>
+        <p:nvSpPr>
+          <p:cNvPr id="2" name="Espace réservé de l'image des diapositives 1"/>
+          <p:cNvSpPr>
+            <a:spLocks noGrp="1" noRot="1" noChangeAspect="1"/>
+          </p:cNvSpPr>
+          <p:nvPr>
+            <p:ph type="sldImg"/>
+          </p:nvPr>
+        </p:nvSpPr>
+        <p:spPr/>
+      </p:sp>
+      <p:sp>
+        <p:nvSpPr>
+          <p:cNvPr id="3" name="Espace réservé des notes 2"/>
+          <p:cNvSpPr>
+            <a:spLocks noGrp="1"/>
+          </p:cNvSpPr>
+          <p:nvPr>
+            <p:ph type="body" idx="1"/>
+          </p:nvPr>
+        </p:nvSpPr>
+        <p:spPr/>
+        <p:txBody>
+          <a:bodyPr/>
+          <a:lstStyle/>
+          <a:p>
+            <a:r>
+              <a:rPr lang="fr-FR" dirty="0"/>
+              <a:t>En passant la variable </a:t>
+            </a:r>
+            <a:r>
+              <a:rPr lang="fr-FR" dirty="0" err="1"/>
+              <a:t>mean_income</a:t>
+            </a:r>
+            <a:r>
+              <a:rPr lang="fr-FR" dirty="0"/>
+              <a:t> en </a:t>
+            </a:r>
+            <a:r>
+              <a:rPr lang="fr-FR" dirty="0" err="1"/>
+              <a:t>logarithm</a:t>
+            </a:r>
+            <a:r>
+              <a:rPr lang="fr-FR" dirty="0"/>
+              <a:t> on obtient deux paramètres significatifs, cependant, on peut voir que le R-</a:t>
+            </a:r>
+            <a:r>
+              <a:rPr lang="fr-FR" dirty="0" err="1"/>
+              <a:t>squared</a:t>
+            </a:r>
+            <a:r>
+              <a:rPr lang="fr-FR" dirty="0"/>
+              <a:t> est faible : 0.359 </a:t>
+            </a:r>
+          </a:p>
+          <a:p>
+            <a:endParaRPr lang="fr-FR" dirty="0"/>
+          </a:p>
+          <a:p>
+            <a:r>
+              <a:rPr lang="fr-FR" dirty="0"/>
+              <a:t>On gardera tout de même ce modèle puisqu'il contient plus de paramètres </a:t>
+            </a:r>
+          </a:p>
+          <a:p>
+            <a:endParaRPr lang="fr-FR" dirty="0"/>
+          </a:p>
+          <a:p>
+            <a:r>
+              <a:rPr lang="fr-FR" dirty="0"/>
+              <a:t>La décomposition de variance totale expliquée pour le pays de naissance est donc égale à 0.359 </a:t>
+            </a:r>
+          </a:p>
+          <a:p>
+            <a:r>
+              <a:rPr lang="fr-FR" dirty="0"/>
+              <a:t>Et pour les autres facteurs, on a 1-0.359 = 0.641 </a:t>
+            </a:r>
+          </a:p>
+          <a:p>
+            <a:endParaRPr lang="fr-FR" dirty="0"/>
+          </a:p>
+        </p:txBody>
+      </p:sp>
+      <p:sp>
+        <p:nvSpPr>
+          <p:cNvPr id="4" name="Espace réservé du numéro de diapositive 3"/>
+          <p:cNvSpPr>
+            <a:spLocks noGrp="1"/>
+          </p:cNvSpPr>
+          <p:nvPr>
+            <p:ph type="sldNum" sz="quarter" idx="5"/>
+          </p:nvPr>
+        </p:nvSpPr>
+        <p:spPr/>
+        <p:txBody>
+          <a:bodyPr/>
+          <a:lstStyle/>
+          <a:p>
+            <a:fld id="{F44DFA25-216B-4048-9E14-17772AFFB9C9}" type="slidenum">
+              <a:rPr lang="fr-FR" smtClean="0"/>
+              <a:t>33</a:t>
+            </a:fld>
+            <a:endParaRPr lang="fr-FR"/>
+          </a:p>
+        </p:txBody>
+      </p:sp>
+    </p:spTree>
+    <p:extLst>
+      <p:ext uri="{BB962C8B-B14F-4D97-AF65-F5344CB8AC3E}">
+        <p14:creationId xmlns:p14="http://schemas.microsoft.com/office/powerpoint/2010/main" val="1210482076"/>
+      </p:ext>
+    </p:extLst>
+  </p:cSld>
+  <p:clrMapOvr>
+    <a:masterClrMapping/>
+  </p:clrMapOvr>
+</p:notes>
+</file>
+
+<file path=ppt/notesSlides/notesSlide33.xml><?xml version="1.0" encoding="utf-8"?>
+<p:notes xmlns:a="http://schemas.openxmlformats.org/drawingml/2006/main" xmlns:r="http://schemas.openxmlformats.org/officeDocument/2006/relationships" xmlns:p="http://schemas.openxmlformats.org/presentationml/2006/main">
+  <p:cSld>
+    <p:spTree>
+      <p:nvGrpSpPr>
+        <p:cNvPr id="1" name=""/>
+        <p:cNvGrpSpPr/>
+        <p:nvPr/>
+      </p:nvGrpSpPr>
+      <p:grpSpPr>
+        <a:xfrm>
+          <a:off x="0" y="0"/>
+          <a:ext cx="0" cy="0"/>
+          <a:chOff x="0" y="0"/>
+          <a:chExt cx="0" cy="0"/>
+        </a:xfrm>
+      </p:grpSpPr>
+      <p:sp>
+        <p:nvSpPr>
+          <p:cNvPr id="2" name="Espace réservé de l'image des diapositives 1"/>
+          <p:cNvSpPr>
+            <a:spLocks noGrp="1" noRot="1" noChangeAspect="1"/>
+          </p:cNvSpPr>
+          <p:nvPr>
+            <p:ph type="sldImg"/>
+          </p:nvPr>
+        </p:nvSpPr>
+        <p:spPr/>
+      </p:sp>
+      <p:sp>
+        <p:nvSpPr>
+          <p:cNvPr id="3" name="Espace réservé des notes 2"/>
+          <p:cNvSpPr>
+            <a:spLocks noGrp="1"/>
+          </p:cNvSpPr>
+          <p:nvPr>
+            <p:ph type="body" idx="1"/>
+          </p:nvPr>
+        </p:nvSpPr>
+        <p:spPr/>
+        <p:txBody>
+          <a:bodyPr/>
+          <a:lstStyle/>
+          <a:p>
+            <a:r>
+              <a:rPr lang="fr-FR" dirty="0"/>
+              <a:t>Les paramètres sont là aussi significatifs, cependant le R-</a:t>
+            </a:r>
+            <a:r>
+              <a:rPr lang="fr-FR" dirty="0" err="1"/>
+              <a:t>squared</a:t>
+            </a:r>
+            <a:r>
+              <a:rPr lang="fr-FR" dirty="0"/>
+              <a:t> est inférieur à la reg précédente : 0.389 </a:t>
+            </a:r>
+          </a:p>
+          <a:p>
+            <a:r>
+              <a:rPr lang="fr-FR" dirty="0"/>
+              <a:t>La droite de régression s'écrit donc sous la forme : aX1 + bX2 + cX3 + d ; Soit : </a:t>
+            </a:r>
+            <a:br>
+              <a:rPr lang="fr-FR" dirty="0"/>
+            </a:br>
+            <a:r>
+              <a:rPr lang="fr-FR" dirty="0"/>
+              <a:t>-58.7538*X1 + 6284.2806*X2 + 64.2410*X3 + (-4.683e+04) </a:t>
+            </a:r>
+            <a:br>
+              <a:rPr lang="fr-FR" dirty="0"/>
+            </a:br>
+            <a:r>
+              <a:rPr lang="fr-FR" dirty="0"/>
+              <a:t>Avec : </a:t>
+            </a:r>
+          </a:p>
+          <a:p>
+            <a:r>
+              <a:rPr lang="fr-FR" dirty="0"/>
+              <a:t>X1 = Gini </a:t>
+            </a:r>
+          </a:p>
+          <a:p>
+            <a:r>
+              <a:rPr lang="fr-FR" dirty="0"/>
+              <a:t>X2 = </a:t>
+            </a:r>
+            <a:r>
+              <a:rPr lang="fr-FR" dirty="0" err="1"/>
+              <a:t>Mean_income</a:t>
+            </a:r>
+            <a:r>
+              <a:rPr lang="fr-FR" dirty="0"/>
+              <a:t> (en log) </a:t>
+            </a:r>
+          </a:p>
+          <a:p>
+            <a:r>
+              <a:rPr lang="fr-FR" dirty="0"/>
+              <a:t>X3 = </a:t>
+            </a:r>
+            <a:r>
+              <a:rPr lang="fr-FR" dirty="0" err="1"/>
+              <a:t>c_i_parents</a:t>
+            </a:r>
+            <a:r>
+              <a:rPr lang="fr-FR" dirty="0"/>
+              <a:t> </a:t>
+            </a:r>
+          </a:p>
+          <a:p>
+            <a:r>
+              <a:rPr lang="fr-FR" dirty="0"/>
+              <a:t>L'indice de Gini est placé en coefficient négatif, ce qui veut dire que plus l'</a:t>
+            </a:r>
+            <a:r>
+              <a:rPr lang="fr-FR" dirty="0" err="1"/>
+              <a:t>Income</a:t>
+            </a:r>
+            <a:r>
+              <a:rPr lang="fr-FR" dirty="0"/>
+              <a:t> est grand, plus l'indice est petit, et plus le revenu moyen est grand (logique). </a:t>
+            </a:r>
+          </a:p>
+          <a:p>
+            <a:r>
+              <a:rPr lang="fr-FR" dirty="0"/>
+              <a:t>On peut donc en conclure que plus on va dans un pays inégalitaire, plus l'indice est petit, et plus l'</a:t>
+            </a:r>
+            <a:r>
+              <a:rPr lang="fr-FR" dirty="0" err="1"/>
+              <a:t>income</a:t>
+            </a:r>
+            <a:r>
+              <a:rPr lang="fr-FR" dirty="0"/>
+              <a:t> est grand ; Un pays inégalitaire ne favorise donc pas plus de personne qu'il n'en défavorise </a:t>
+            </a:r>
+          </a:p>
+          <a:p>
+            <a:r>
+              <a:rPr lang="fr-FR" dirty="0"/>
+              <a:t>Ici, la décomposition de variance totale expliquée pour le pays de naissance est égale à 0.389 ; Et celle non expliquée est de 1-0.389 = 0.611 </a:t>
+            </a:r>
+          </a:p>
+          <a:p>
+            <a:endParaRPr lang="fr-FR" dirty="0"/>
+          </a:p>
+        </p:txBody>
+      </p:sp>
+      <p:sp>
+        <p:nvSpPr>
+          <p:cNvPr id="4" name="Espace réservé du numéro de diapositive 3"/>
+          <p:cNvSpPr>
+            <a:spLocks noGrp="1"/>
+          </p:cNvSpPr>
+          <p:nvPr>
+            <p:ph type="sldNum" sz="quarter" idx="5"/>
+          </p:nvPr>
+        </p:nvSpPr>
+        <p:spPr/>
+        <p:txBody>
+          <a:bodyPr/>
+          <a:lstStyle/>
+          <a:p>
+            <a:fld id="{F44DFA25-216B-4048-9E14-17772AFFB9C9}" type="slidenum">
+              <a:rPr lang="fr-FR" smtClean="0"/>
+              <a:t>34</a:t>
+            </a:fld>
+            <a:endParaRPr lang="fr-FR"/>
+          </a:p>
+        </p:txBody>
+      </p:sp>
+    </p:spTree>
+    <p:extLst>
+      <p:ext uri="{BB962C8B-B14F-4D97-AF65-F5344CB8AC3E}">
+        <p14:creationId xmlns:p14="http://schemas.microsoft.com/office/powerpoint/2010/main" val="4173650160"/>
+      </p:ext>
+    </p:extLst>
+  </p:cSld>
+  <p:clrMapOvr>
+    <a:masterClrMapping/>
+  </p:clrMapOvr>
+</p:notes>
+</file>
+
+<file path=ppt/notesSlides/notesSlide34.xml><?xml version="1.0" encoding="utf-8"?>
+<p:notes xmlns:a="http://schemas.openxmlformats.org/drawingml/2006/main" xmlns:r="http://schemas.openxmlformats.org/officeDocument/2006/relationships" xmlns:p="http://schemas.openxmlformats.org/presentationml/2006/main">
+  <p:cSld>
+    <p:spTree>
+      <p:nvGrpSpPr>
+        <p:cNvPr id="1" name=""/>
+        <p:cNvGrpSpPr/>
+        <p:nvPr/>
+      </p:nvGrpSpPr>
+      <p:grpSpPr>
+        <a:xfrm>
+          <a:off x="0" y="0"/>
+          <a:ext cx="0" cy="0"/>
+          <a:chOff x="0" y="0"/>
+          <a:chExt cx="0" cy="0"/>
+        </a:xfrm>
+      </p:grpSpPr>
+      <p:sp>
+        <p:nvSpPr>
+          <p:cNvPr id="2" name="Espace réservé de l'image des diapositives 1"/>
+          <p:cNvSpPr>
+            <a:spLocks noGrp="1" noRot="1" noChangeAspect="1"/>
+          </p:cNvSpPr>
+          <p:nvPr>
+            <p:ph type="sldImg"/>
+          </p:nvPr>
+        </p:nvSpPr>
+        <p:spPr/>
+      </p:sp>
+      <p:sp>
+        <p:nvSpPr>
+          <p:cNvPr id="3" name="Espace réservé des notes 2"/>
+          <p:cNvSpPr>
+            <a:spLocks noGrp="1"/>
+          </p:cNvSpPr>
+          <p:nvPr>
+            <p:ph type="body" idx="1"/>
+          </p:nvPr>
+        </p:nvSpPr>
+        <p:spPr/>
+        <p:txBody>
+          <a:bodyPr/>
+          <a:lstStyle/>
+          <a:p>
+            <a:r>
+              <a:rPr lang="fr-FR" dirty="0"/>
+              <a:t>Il y a colinéarité si l'une des </a:t>
+            </a:r>
+            <a:r>
+              <a:rPr lang="fr-FR" dirty="0" err="1"/>
+              <a:t>eigen</a:t>
+            </a:r>
+            <a:r>
+              <a:rPr lang="fr-FR" dirty="0"/>
+              <a:t> values était proche de 0</a:t>
+            </a:r>
+          </a:p>
+        </p:txBody>
+      </p:sp>
+      <p:sp>
+        <p:nvSpPr>
+          <p:cNvPr id="4" name="Espace réservé du numéro de diapositive 3"/>
+          <p:cNvSpPr>
+            <a:spLocks noGrp="1"/>
+          </p:cNvSpPr>
+          <p:nvPr>
+            <p:ph type="sldNum" sz="quarter" idx="5"/>
+          </p:nvPr>
+        </p:nvSpPr>
+        <p:spPr/>
+        <p:txBody>
+          <a:bodyPr/>
+          <a:lstStyle/>
+          <a:p>
+            <a:fld id="{F44DFA25-216B-4048-9E14-17772AFFB9C9}" type="slidenum">
+              <a:rPr lang="fr-FR" smtClean="0"/>
+              <a:t>35</a:t>
+            </a:fld>
+            <a:endParaRPr lang="fr-FR"/>
+          </a:p>
+        </p:txBody>
+      </p:sp>
+    </p:spTree>
+    <p:extLst>
+      <p:ext uri="{BB962C8B-B14F-4D97-AF65-F5344CB8AC3E}">
+        <p14:creationId xmlns:p14="http://schemas.microsoft.com/office/powerpoint/2010/main" val="3999435860"/>
+      </p:ext>
+    </p:extLst>
+  </p:cSld>
+  <p:clrMapOvr>
+    <a:masterClrMapping/>
+  </p:clrMapOvr>
+</p:notes>
+</file>
+
+<file path=ppt/notesSlides/notesSlide35.xml><?xml version="1.0" encoding="utf-8"?>
+<p:notes xmlns:a="http://schemas.openxmlformats.org/drawingml/2006/main" xmlns:r="http://schemas.openxmlformats.org/officeDocument/2006/relationships" xmlns:p="http://schemas.openxmlformats.org/presentationml/2006/main">
+  <p:cSld>
+    <p:spTree>
+      <p:nvGrpSpPr>
+        <p:cNvPr id="1" name=""/>
+        <p:cNvGrpSpPr/>
+        <p:nvPr/>
+      </p:nvGrpSpPr>
+      <p:grpSpPr>
+        <a:xfrm>
+          <a:off x="0" y="0"/>
+          <a:ext cx="0" cy="0"/>
+          <a:chOff x="0" y="0"/>
+          <a:chExt cx="0" cy="0"/>
+        </a:xfrm>
+      </p:grpSpPr>
+      <p:sp>
+        <p:nvSpPr>
+          <p:cNvPr id="2" name="Espace réservé de l'image des diapositives 1"/>
+          <p:cNvSpPr>
+            <a:spLocks noGrp="1" noRot="1" noChangeAspect="1"/>
+          </p:cNvSpPr>
+          <p:nvPr>
+            <p:ph type="sldImg"/>
+          </p:nvPr>
+        </p:nvSpPr>
+        <p:spPr/>
+      </p:sp>
+      <p:sp>
+        <p:nvSpPr>
+          <p:cNvPr id="3" name="Espace réservé des notes 2"/>
+          <p:cNvSpPr>
+            <a:spLocks noGrp="1"/>
+          </p:cNvSpPr>
+          <p:nvPr>
+            <p:ph type="body" idx="1"/>
+          </p:nvPr>
+        </p:nvSpPr>
+        <p:spPr/>
+        <p:txBody>
+          <a:bodyPr/>
+          <a:lstStyle/>
+          <a:p>
+            <a:r>
+              <a:rPr lang="fr-FR" dirty="0"/>
+              <a:t>Pour tous les niveaux de test, la </a:t>
+            </a:r>
+            <a:r>
+              <a:rPr lang="fr-FR" dirty="0" err="1"/>
+              <a:t>critical</a:t>
+            </a:r>
+            <a:r>
+              <a:rPr lang="fr-FR" dirty="0"/>
+              <a:t> value est en dessous de la statistique ; Les résidus suivent donc bien une loi normal</a:t>
+            </a:r>
+          </a:p>
+        </p:txBody>
+      </p:sp>
+      <p:sp>
+        <p:nvSpPr>
+          <p:cNvPr id="4" name="Espace réservé du numéro de diapositive 3"/>
+          <p:cNvSpPr>
+            <a:spLocks noGrp="1"/>
+          </p:cNvSpPr>
+          <p:nvPr>
+            <p:ph type="sldNum" sz="quarter" idx="5"/>
+          </p:nvPr>
+        </p:nvSpPr>
+        <p:spPr/>
+        <p:txBody>
+          <a:bodyPr/>
+          <a:lstStyle/>
+          <a:p>
+            <a:fld id="{F44DFA25-216B-4048-9E14-17772AFFB9C9}" type="slidenum">
+              <a:rPr lang="fr-FR" smtClean="0"/>
+              <a:t>36</a:t>
+            </a:fld>
+            <a:endParaRPr lang="fr-FR"/>
+          </a:p>
+        </p:txBody>
+      </p:sp>
+    </p:spTree>
+    <p:extLst>
+      <p:ext uri="{BB962C8B-B14F-4D97-AF65-F5344CB8AC3E}">
+        <p14:creationId xmlns:p14="http://schemas.microsoft.com/office/powerpoint/2010/main" val="1794729029"/>
       </p:ext>
     </p:extLst>
   </p:cSld>
@@ -4254,7 +4977,7 @@
           <a:p>
             <a:fld id="{D6A1C655-8375-4C41-9B67-B1C03E7EEC05}" type="datetimeFigureOut">
               <a:rPr lang="fr-FR" smtClean="0"/>
-              <a:t>02/07/2019</a:t>
+              <a:t>01/08/2019</a:t>
             </a:fld>
             <a:endParaRPr lang="fr-FR"/>
           </a:p>
@@ -4452,7 +5175,7 @@
           <a:p>
             <a:fld id="{D6A1C655-8375-4C41-9B67-B1C03E7EEC05}" type="datetimeFigureOut">
               <a:rPr lang="fr-FR" smtClean="0"/>
-              <a:t>02/07/2019</a:t>
+              <a:t>01/08/2019</a:t>
             </a:fld>
             <a:endParaRPr lang="fr-FR"/>
           </a:p>
@@ -4660,7 +5383,7 @@
           <a:p>
             <a:fld id="{D6A1C655-8375-4C41-9B67-B1C03E7EEC05}" type="datetimeFigureOut">
               <a:rPr lang="fr-FR" smtClean="0"/>
-              <a:t>02/07/2019</a:t>
+              <a:t>01/08/2019</a:t>
             </a:fld>
             <a:endParaRPr lang="fr-FR"/>
           </a:p>
@@ -4858,7 +5581,7 @@
           <a:p>
             <a:fld id="{D6A1C655-8375-4C41-9B67-B1C03E7EEC05}" type="datetimeFigureOut">
               <a:rPr lang="fr-FR" smtClean="0"/>
-              <a:t>02/07/2019</a:t>
+              <a:t>01/08/2019</a:t>
             </a:fld>
             <a:endParaRPr lang="fr-FR"/>
           </a:p>
@@ -5133,7 +5856,7 @@
           <a:p>
             <a:fld id="{D6A1C655-8375-4C41-9B67-B1C03E7EEC05}" type="datetimeFigureOut">
               <a:rPr lang="fr-FR" smtClean="0"/>
-              <a:t>02/07/2019</a:t>
+              <a:t>01/08/2019</a:t>
             </a:fld>
             <a:endParaRPr lang="fr-FR"/>
           </a:p>
@@ -5398,7 +6121,7 @@
           <a:p>
             <a:fld id="{D6A1C655-8375-4C41-9B67-B1C03E7EEC05}" type="datetimeFigureOut">
               <a:rPr lang="fr-FR" smtClean="0"/>
-              <a:t>02/07/2019</a:t>
+              <a:t>01/08/2019</a:t>
             </a:fld>
             <a:endParaRPr lang="fr-FR"/>
           </a:p>
@@ -5810,7 +6533,7 @@
           <a:p>
             <a:fld id="{D6A1C655-8375-4C41-9B67-B1C03E7EEC05}" type="datetimeFigureOut">
               <a:rPr lang="fr-FR" smtClean="0"/>
-              <a:t>02/07/2019</a:t>
+              <a:t>01/08/2019</a:t>
             </a:fld>
             <a:endParaRPr lang="fr-FR"/>
           </a:p>
@@ -5951,7 +6674,7 @@
           <a:p>
             <a:fld id="{D6A1C655-8375-4C41-9B67-B1C03E7EEC05}" type="datetimeFigureOut">
               <a:rPr lang="fr-FR" smtClean="0"/>
-              <a:t>02/07/2019</a:t>
+              <a:t>01/08/2019</a:t>
             </a:fld>
             <a:endParaRPr lang="fr-FR"/>
           </a:p>
@@ -6064,7 +6787,7 @@
           <a:p>
             <a:fld id="{D6A1C655-8375-4C41-9B67-B1C03E7EEC05}" type="datetimeFigureOut">
               <a:rPr lang="fr-FR" smtClean="0"/>
-              <a:t>02/07/2019</a:t>
+              <a:t>01/08/2019</a:t>
             </a:fld>
             <a:endParaRPr lang="fr-FR"/>
           </a:p>
@@ -6375,7 +7098,7 @@
           <a:p>
             <a:fld id="{D6A1C655-8375-4C41-9B67-B1C03E7EEC05}" type="datetimeFigureOut">
               <a:rPr lang="fr-FR" smtClean="0"/>
-              <a:t>02/07/2019</a:t>
+              <a:t>01/08/2019</a:t>
             </a:fld>
             <a:endParaRPr lang="fr-FR"/>
           </a:p>
@@ -6663,7 +7386,7 @@
           <a:p>
             <a:fld id="{D6A1C655-8375-4C41-9B67-B1C03E7EEC05}" type="datetimeFigureOut">
               <a:rPr lang="fr-FR" smtClean="0"/>
-              <a:t>02/07/2019</a:t>
+              <a:t>01/08/2019</a:t>
             </a:fld>
             <a:endParaRPr lang="fr-FR"/>
           </a:p>
@@ -6904,7 +7627,7 @@
           <a:p>
             <a:fld id="{D6A1C655-8375-4C41-9B67-B1C03E7EEC05}" type="datetimeFigureOut">
               <a:rPr lang="fr-FR" smtClean="0"/>
-              <a:t>02/07/2019</a:t>
+              <a:t>01/08/2019</a:t>
             </a:fld>
             <a:endParaRPr lang="fr-FR"/>
           </a:p>
@@ -13690,10 +14413,45 @@
       </p:pic>
       <p:pic>
         <p:nvPicPr>
+          <p:cNvPr id="7" name="Image 6">
+            <a:extLst>
+              <a:ext uri="{FF2B5EF4-FFF2-40B4-BE49-F238E27FC236}">
+                <a16:creationId xmlns:a16="http://schemas.microsoft.com/office/drawing/2014/main" id="{2203989A-2EE8-40ED-B61F-DA1C11492DC0}"/>
+              </a:ext>
+            </a:extLst>
+          </p:cNvPr>
+          <p:cNvPicPr>
+            <a:picLocks noChangeAspect="1"/>
+          </p:cNvPicPr>
+          <p:nvPr/>
+        </p:nvPicPr>
+        <p:blipFill rotWithShape="1">
+          <a:blip r:embed="rId4">
+            <a:extLst>
+              <a:ext uri="{28A0092B-C50C-407E-A947-70E740481C1C}">
+                <a14:useLocalDpi xmlns:a14="http://schemas.microsoft.com/office/drawing/2010/main" val="0"/>
+              </a:ext>
+            </a:extLst>
+          </a:blip>
+          <a:srcRect l="6893" t="10895" r="8542" b="5777"/>
+          <a:stretch/>
+        </p:blipFill>
+        <p:spPr>
+          <a:xfrm>
+            <a:off x="2115014" y="1442721"/>
+            <a:ext cx="7961971" cy="5230375"/>
+          </a:xfrm>
+          <a:prstGeom prst="rect">
+            <a:avLst/>
+          </a:prstGeom>
+        </p:spPr>
+      </p:pic>
+      <p:pic>
+        <p:nvPicPr>
           <p:cNvPr id="3" name="Image 2">
             <a:extLst>
               <a:ext uri="{FF2B5EF4-FFF2-40B4-BE49-F238E27FC236}">
-                <a16:creationId xmlns:a16="http://schemas.microsoft.com/office/drawing/2014/main" id="{F485D957-CD03-4E00-B8C0-40A55E334F96}"/>
+                <a16:creationId xmlns:a16="http://schemas.microsoft.com/office/drawing/2014/main" id="{6C18ACC2-1C6E-4149-A793-78B890919358}"/>
               </a:ext>
             </a:extLst>
           </p:cNvPr>
@@ -13703,15 +14461,15 @@
           <p:nvPr/>
         </p:nvPicPr>
         <p:blipFill>
-          <a:blip r:embed="rId4"/>
+          <a:blip r:embed="rId5"/>
           <a:stretch>
             <a:fillRect/>
           </a:stretch>
         </p:blipFill>
         <p:spPr>
           <a:xfrm>
-            <a:off x="2981325" y="1478526"/>
-            <a:ext cx="6229350" cy="266700"/>
+            <a:off x="9783762" y="2814896"/>
+            <a:ext cx="1971675" cy="2486025"/>
           </a:xfrm>
           <a:prstGeom prst="rect">
             <a:avLst/>
@@ -13723,7 +14481,7 @@
           <p:cNvPr id="5" name="ZoneTexte 4">
             <a:extLst>
               <a:ext uri="{FF2B5EF4-FFF2-40B4-BE49-F238E27FC236}">
-                <a16:creationId xmlns:a16="http://schemas.microsoft.com/office/drawing/2014/main" id="{1A49C935-CC7B-42DF-8FA5-A0B1E272CB9D}"/>
+                <a16:creationId xmlns:a16="http://schemas.microsoft.com/office/drawing/2014/main" id="{FD5D07AF-F04E-495F-85CD-F3ABF00D4A07}"/>
               </a:ext>
             </a:extLst>
           </p:cNvPr>
@@ -13732,8 +14490,8 @@
         </p:nvSpPr>
         <p:spPr>
           <a:xfrm>
-            <a:off x="311285" y="0"/>
-            <a:ext cx="566181" cy="923330"/>
+            <a:off x="10168312" y="2310885"/>
+            <a:ext cx="1197764" cy="369332"/>
           </a:xfrm>
           <a:prstGeom prst="rect">
             <a:avLst/>
@@ -13747,12 +14505,8 @@
           <a:lstStyle/>
           <a:p>
             <a:r>
-              <a:rPr lang="fr-FR" sz="5400" b="1" dirty="0">
-                <a:solidFill>
-                  <a:srgbClr val="FF0000"/>
-                </a:solidFill>
-              </a:rPr>
-              <a:t>X</a:t>
+              <a:rPr lang="fr-FR" dirty="0"/>
+              <a:t>Variances :</a:t>
             </a:r>
           </a:p>
         </p:txBody>
@@ -13767,6 +14521,151 @@
   <p:clrMapOvr>
     <a:masterClrMapping/>
   </p:clrMapOvr>
+  <p:timing>
+    <p:tnLst>
+      <p:par>
+        <p:cTn id="1" dur="indefinite" restart="never" nodeType="tmRoot">
+          <p:childTnLst>
+            <p:seq concurrent="1" nextAc="seek">
+              <p:cTn id="2" dur="indefinite" nodeType="mainSeq">
+                <p:childTnLst>
+                  <p:par>
+                    <p:cTn id="3" fill="hold">
+                      <p:stCondLst>
+                        <p:cond delay="indefinite"/>
+                      </p:stCondLst>
+                      <p:childTnLst>
+                        <p:par>
+                          <p:cTn id="4" fill="hold">
+                            <p:stCondLst>
+                              <p:cond delay="0"/>
+                            </p:stCondLst>
+                            <p:childTnLst>
+                              <p:par>
+                                <p:cTn id="5" presetID="42" presetClass="path" presetSubtype="0" accel="50000" decel="50000" fill="hold" nodeType="clickEffect">
+                                  <p:stCondLst>
+                                    <p:cond delay="0"/>
+                                  </p:stCondLst>
+                                  <p:childTnLst>
+                                    <p:animMotion origin="layout" path="M 0 3.33333E-6 L -0.15052 -0.00023 " pathEditMode="relative" rAng="0" ptsTypes="AA">
+                                      <p:cBhvr>
+                                        <p:cTn id="6" dur="2000" fill="hold"/>
+                                        <p:tgtEl>
+                                          <p:spTgt spid="7"/>
+                                        </p:tgtEl>
+                                        <p:attrNameLst>
+                                          <p:attrName>ppt_x</p:attrName>
+                                          <p:attrName>ppt_y</p:attrName>
+                                        </p:attrNameLst>
+                                      </p:cBhvr>
+                                      <p:rCtr x="-7526" y="-23"/>
+                                    </p:animMotion>
+                                  </p:childTnLst>
+                                </p:cTn>
+                              </p:par>
+                            </p:childTnLst>
+                          </p:cTn>
+                        </p:par>
+                        <p:par>
+                          <p:cTn id="7" fill="hold">
+                            <p:stCondLst>
+                              <p:cond delay="2000"/>
+                            </p:stCondLst>
+                            <p:childTnLst>
+                              <p:par>
+                                <p:cTn id="8" presetID="1" presetClass="entr" presetSubtype="0" fill="hold" grpId="0" nodeType="afterEffect">
+                                  <p:stCondLst>
+                                    <p:cond delay="0"/>
+                                  </p:stCondLst>
+                                  <p:childTnLst>
+                                    <p:set>
+                                      <p:cBhvr>
+                                        <p:cTn id="9" dur="1" fill="hold">
+                                          <p:stCondLst>
+                                            <p:cond delay="0"/>
+                                          </p:stCondLst>
+                                        </p:cTn>
+                                        <p:tgtEl>
+                                          <p:spTgt spid="5"/>
+                                        </p:tgtEl>
+                                        <p:attrNameLst>
+                                          <p:attrName>style.visibility</p:attrName>
+                                        </p:attrNameLst>
+                                      </p:cBhvr>
+                                      <p:to>
+                                        <p:strVal val="visible"/>
+                                      </p:to>
+                                    </p:set>
+                                  </p:childTnLst>
+                                </p:cTn>
+                              </p:par>
+                            </p:childTnLst>
+                          </p:cTn>
+                        </p:par>
+                        <p:par>
+                          <p:cTn id="10" fill="hold">
+                            <p:stCondLst>
+                              <p:cond delay="2000"/>
+                            </p:stCondLst>
+                            <p:childTnLst>
+                              <p:par>
+                                <p:cTn id="11" presetID="1" presetClass="entr" presetSubtype="0" fill="hold" nodeType="afterEffect">
+                                  <p:stCondLst>
+                                    <p:cond delay="0"/>
+                                  </p:stCondLst>
+                                  <p:childTnLst>
+                                    <p:set>
+                                      <p:cBhvr>
+                                        <p:cTn id="12" dur="1" fill="hold">
+                                          <p:stCondLst>
+                                            <p:cond delay="0"/>
+                                          </p:stCondLst>
+                                        </p:cTn>
+                                        <p:tgtEl>
+                                          <p:spTgt spid="3"/>
+                                        </p:tgtEl>
+                                        <p:attrNameLst>
+                                          <p:attrName>style.visibility</p:attrName>
+                                        </p:attrNameLst>
+                                      </p:cBhvr>
+                                      <p:to>
+                                        <p:strVal val="visible"/>
+                                      </p:to>
+                                    </p:set>
+                                  </p:childTnLst>
+                                </p:cTn>
+                              </p:par>
+                            </p:childTnLst>
+                          </p:cTn>
+                        </p:par>
+                      </p:childTnLst>
+                    </p:cTn>
+                  </p:par>
+                </p:childTnLst>
+              </p:cTn>
+              <p:prevCondLst>
+                <p:cond evt="onPrev" delay="0">
+                  <p:tgtEl>
+                    <p:sldTgt/>
+                  </p:tgtEl>
+                </p:cond>
+              </p:prevCondLst>
+              <p:nextCondLst>
+                <p:cond evt="onNext" delay="0">
+                  <p:tgtEl>
+                    <p:sldTgt/>
+                  </p:tgtEl>
+                </p:cond>
+              </p:nextCondLst>
+            </p:seq>
+          </p:childTnLst>
+        </p:cTn>
+      </p:par>
+    </p:tnLst>
+    <p:bldLst>
+      <p:bldP spid="5" grpId="0"/>
+    </p:bldLst>
+  </p:timing>
 </p:sld>
 </file>
 
@@ -14339,7 +15238,7 @@
           <a:p>
             <a:r>
               <a:rPr lang="fr-FR" dirty="0"/>
-              <a:t>Régressions linéaires</a:t>
+              <a:t>ANOVA</a:t>
             </a:r>
           </a:p>
         </p:txBody>
@@ -14380,55 +15279,151 @@
           </a:prstGeom>
         </p:spPr>
       </p:pic>
-      <p:sp>
-        <p:nvSpPr>
-          <p:cNvPr id="5" name="ZoneTexte 4">
-            <a:extLst>
-              <a:ext uri="{FF2B5EF4-FFF2-40B4-BE49-F238E27FC236}">
-                <a16:creationId xmlns:a16="http://schemas.microsoft.com/office/drawing/2014/main" id="{C7860E63-B6AB-4429-971A-BC715AE7C97C}"/>
-              </a:ext>
-            </a:extLst>
-          </p:cNvPr>
-          <p:cNvSpPr txBox="1"/>
+      <p:pic>
+        <p:nvPicPr>
+          <p:cNvPr id="3" name="Image 2">
+            <a:extLst>
+              <a:ext uri="{FF2B5EF4-FFF2-40B4-BE49-F238E27FC236}">
+                <a16:creationId xmlns:a16="http://schemas.microsoft.com/office/drawing/2014/main" id="{F485D957-CD03-4E00-B8C0-40A55E334F96}"/>
+              </a:ext>
+            </a:extLst>
+          </p:cNvPr>
+          <p:cNvPicPr>
+            <a:picLocks noChangeAspect="1"/>
+          </p:cNvPicPr>
           <p:nvPr/>
-        </p:nvSpPr>
+        </p:nvPicPr>
+        <p:blipFill>
+          <a:blip r:embed="rId4"/>
+          <a:stretch>
+            <a:fillRect/>
+          </a:stretch>
+        </p:blipFill>
         <p:spPr>
           <a:xfrm>
-            <a:off x="311285" y="0"/>
-            <a:ext cx="566181" cy="923330"/>
+            <a:off x="2981325" y="1478526"/>
+            <a:ext cx="6229350" cy="266700"/>
           </a:xfrm>
           <a:prstGeom prst="rect">
             <a:avLst/>
           </a:prstGeom>
-          <a:noFill/>
-        </p:spPr>
-        <p:txBody>
-          <a:bodyPr wrap="none" rtlCol="0">
-            <a:spAutoFit/>
-          </a:bodyPr>
-          <a:lstStyle/>
-          <a:p>
-            <a:r>
-              <a:rPr lang="fr-FR" sz="5400" b="1" dirty="0">
-                <a:solidFill>
-                  <a:srgbClr val="FF0000"/>
-                </a:solidFill>
-              </a:rPr>
-              <a:t>X</a:t>
-            </a:r>
-          </a:p>
-        </p:txBody>
-      </p:sp>
+        </p:spPr>
+      </p:pic>
+      <p:pic>
+        <p:nvPicPr>
+          <p:cNvPr id="6" name="Image 5">
+            <a:extLst>
+              <a:ext uri="{FF2B5EF4-FFF2-40B4-BE49-F238E27FC236}">
+                <a16:creationId xmlns:a16="http://schemas.microsoft.com/office/drawing/2014/main" id="{C245F48B-8F71-45C3-ABC8-A9E3DAC0666C}"/>
+              </a:ext>
+            </a:extLst>
+          </p:cNvPr>
+          <p:cNvPicPr>
+            <a:picLocks noChangeAspect="1"/>
+          </p:cNvPicPr>
+          <p:nvPr/>
+        </p:nvPicPr>
+        <p:blipFill>
+          <a:blip r:embed="rId5"/>
+          <a:stretch>
+            <a:fillRect/>
+          </a:stretch>
+        </p:blipFill>
+        <p:spPr>
+          <a:xfrm>
+            <a:off x="1511857" y="2126580"/>
+            <a:ext cx="9168285" cy="4020220"/>
+          </a:xfrm>
+          <a:prstGeom prst="rect">
+            <a:avLst/>
+          </a:prstGeom>
+        </p:spPr>
+      </p:pic>
     </p:spTree>
     <p:extLst>
       <p:ext uri="{BB962C8B-B14F-4D97-AF65-F5344CB8AC3E}">
-        <p14:creationId xmlns:p14="http://schemas.microsoft.com/office/powerpoint/2010/main" val="178401512"/>
+        <p14:creationId xmlns:p14="http://schemas.microsoft.com/office/powerpoint/2010/main" val="1235220910"/>
       </p:ext>
     </p:extLst>
   </p:cSld>
   <p:clrMapOvr>
     <a:masterClrMapping/>
   </p:clrMapOvr>
+  <p:timing>
+    <p:tnLst>
+      <p:par>
+        <p:cTn id="1" dur="indefinite" restart="never" nodeType="tmRoot">
+          <p:childTnLst>
+            <p:seq concurrent="1" nextAc="seek">
+              <p:cTn id="2" dur="indefinite" nodeType="mainSeq">
+                <p:childTnLst>
+                  <p:par>
+                    <p:cTn id="3" fill="hold">
+                      <p:stCondLst>
+                        <p:cond delay="indefinite"/>
+                      </p:stCondLst>
+                      <p:childTnLst>
+                        <p:par>
+                          <p:cTn id="4" fill="hold">
+                            <p:stCondLst>
+                              <p:cond delay="0"/>
+                            </p:stCondLst>
+                            <p:childTnLst>
+                              <p:par>
+                                <p:cTn id="5" presetID="1" presetClass="entr" presetSubtype="0" fill="hold" nodeType="clickEffect">
+                                  <p:stCondLst>
+                                    <p:cond delay="0"/>
+                                  </p:stCondLst>
+                                  <p:childTnLst>
+                                    <p:set>
+                                      <p:cBhvr>
+                                        <p:cTn id="6" dur="1" fill="hold">
+                                          <p:stCondLst>
+                                            <p:cond delay="0"/>
+                                          </p:stCondLst>
+                                        </p:cTn>
+                                        <p:tgtEl>
+                                          <p:spTgt spid="6"/>
+                                        </p:tgtEl>
+                                        <p:attrNameLst>
+                                          <p:attrName>style.visibility</p:attrName>
+                                        </p:attrNameLst>
+                                      </p:cBhvr>
+                                      <p:to>
+                                        <p:strVal val="visible"/>
+                                      </p:to>
+                                    </p:set>
+                                  </p:childTnLst>
+                                </p:cTn>
+                              </p:par>
+                            </p:childTnLst>
+                          </p:cTn>
+                        </p:par>
+                      </p:childTnLst>
+                    </p:cTn>
+                  </p:par>
+                </p:childTnLst>
+              </p:cTn>
+              <p:prevCondLst>
+                <p:cond evt="onPrev" delay="0">
+                  <p:tgtEl>
+                    <p:sldTgt/>
+                  </p:tgtEl>
+                </p:cond>
+              </p:prevCondLst>
+              <p:nextCondLst>
+                <p:cond evt="onNext" delay="0">
+                  <p:tgtEl>
+                    <p:sldTgt/>
+                  </p:tgtEl>
+                </p:cond>
+              </p:nextCondLst>
+            </p:seq>
+          </p:childTnLst>
+        </p:cTn>
+      </p:par>
+    </p:tnLst>
+  </p:timing>
 </p:sld>
 </file>
 
@@ -14449,6 +15444,41 @@
           <a:chExt cx="0" cy="0"/>
         </a:xfrm>
       </p:grpSpPr>
+      <p:sp>
+        <p:nvSpPr>
+          <p:cNvPr id="2" name="Titre 1">
+            <a:extLst>
+              <a:ext uri="{FF2B5EF4-FFF2-40B4-BE49-F238E27FC236}">
+                <a16:creationId xmlns:a16="http://schemas.microsoft.com/office/drawing/2014/main" id="{465F4E1D-C2D1-48A3-87E1-EAA86D29F741}"/>
+              </a:ext>
+            </a:extLst>
+          </p:cNvPr>
+          <p:cNvSpPr>
+            <a:spLocks noGrp="1"/>
+          </p:cNvSpPr>
+          <p:nvPr>
+            <p:ph type="ctrTitle"/>
+          </p:nvPr>
+        </p:nvSpPr>
+        <p:spPr>
+          <a:xfrm>
+            <a:off x="524107" y="396240"/>
+            <a:ext cx="11229277" cy="1046481"/>
+          </a:xfrm>
+        </p:spPr>
+        <p:txBody>
+          <a:bodyPr>
+            <a:normAutofit/>
+          </a:bodyPr>
+          <a:lstStyle/>
+          <a:p>
+            <a:r>
+              <a:rPr lang="fr-FR" dirty="0"/>
+              <a:t>Régression linéaire sans logarithme </a:t>
+            </a:r>
+          </a:p>
+        </p:txBody>
+      </p:sp>
       <p:pic>
         <p:nvPicPr>
           <p:cNvPr id="4" name="Image 3">
@@ -14485,6 +15515,184 @@
           </a:prstGeom>
         </p:spPr>
       </p:pic>
+      <p:pic>
+        <p:nvPicPr>
+          <p:cNvPr id="3" name="Image 2">
+            <a:extLst>
+              <a:ext uri="{FF2B5EF4-FFF2-40B4-BE49-F238E27FC236}">
+                <a16:creationId xmlns:a16="http://schemas.microsoft.com/office/drawing/2014/main" id="{87AFD22D-99BF-4889-849F-5D87110904E5}"/>
+              </a:ext>
+            </a:extLst>
+          </p:cNvPr>
+          <p:cNvPicPr>
+            <a:picLocks noChangeAspect="1"/>
+          </p:cNvPicPr>
+          <p:nvPr/>
+        </p:nvPicPr>
+        <p:blipFill>
+          <a:blip r:embed="rId4"/>
+          <a:stretch>
+            <a:fillRect/>
+          </a:stretch>
+        </p:blipFill>
+        <p:spPr>
+          <a:xfrm>
+            <a:off x="2009775" y="1442721"/>
+            <a:ext cx="8172450" cy="333375"/>
+          </a:xfrm>
+          <a:prstGeom prst="rect">
+            <a:avLst/>
+          </a:prstGeom>
+        </p:spPr>
+      </p:pic>
+      <p:pic>
+        <p:nvPicPr>
+          <p:cNvPr id="6" name="Image 5">
+            <a:extLst>
+              <a:ext uri="{FF2B5EF4-FFF2-40B4-BE49-F238E27FC236}">
+                <a16:creationId xmlns:a16="http://schemas.microsoft.com/office/drawing/2014/main" id="{7E1B573B-C4A1-4D86-A473-5264B9239836}"/>
+              </a:ext>
+            </a:extLst>
+          </p:cNvPr>
+          <p:cNvPicPr>
+            <a:picLocks noChangeAspect="1"/>
+          </p:cNvPicPr>
+          <p:nvPr/>
+        </p:nvPicPr>
+        <p:blipFill>
+          <a:blip r:embed="rId5"/>
+          <a:stretch>
+            <a:fillRect/>
+          </a:stretch>
+        </p:blipFill>
+        <p:spPr>
+          <a:xfrm>
+            <a:off x="1438628" y="2356663"/>
+            <a:ext cx="9314743" cy="3790137"/>
+          </a:xfrm>
+          <a:prstGeom prst="rect">
+            <a:avLst/>
+          </a:prstGeom>
+        </p:spPr>
+      </p:pic>
+      <p:sp>
+        <p:nvSpPr>
+          <p:cNvPr id="8" name="Rectangle 7">
+            <a:extLst>
+              <a:ext uri="{FF2B5EF4-FFF2-40B4-BE49-F238E27FC236}">
+                <a16:creationId xmlns:a16="http://schemas.microsoft.com/office/drawing/2014/main" id="{1DE1AC7E-260D-4D8F-AE25-C86694DBF998}"/>
+              </a:ext>
+            </a:extLst>
+          </p:cNvPr>
+          <p:cNvSpPr/>
+          <p:nvPr/>
+        </p:nvSpPr>
+        <p:spPr>
+          <a:xfrm>
+            <a:off x="7248293" y="4802458"/>
+            <a:ext cx="680224" cy="1344341"/>
+          </a:xfrm>
+          <a:prstGeom prst="rect">
+            <a:avLst/>
+          </a:prstGeom>
+          <a:noFill/>
+          <a:ln>
+            <a:solidFill>
+              <a:srgbClr val="FF0000"/>
+            </a:solidFill>
+          </a:ln>
+        </p:spPr>
+        <p:style>
+          <a:lnRef idx="2">
+            <a:schemeClr val="accent1">
+              <a:shade val="50000"/>
+            </a:schemeClr>
+          </a:lnRef>
+          <a:fillRef idx="1">
+            <a:schemeClr val="accent1"/>
+          </a:fillRef>
+          <a:effectRef idx="0">
+            <a:schemeClr val="accent1"/>
+          </a:effectRef>
+          <a:fontRef idx="minor">
+            <a:schemeClr val="lt1"/>
+          </a:fontRef>
+        </p:style>
+        <p:txBody>
+          <a:bodyPr rtlCol="0" anchor="ctr"/>
+          <a:lstStyle/>
+          <a:p>
+            <a:pPr algn="ctr"/>
+            <a:endParaRPr lang="fr-FR"/>
+          </a:p>
+        </p:txBody>
+      </p:sp>
+    </p:spTree>
+    <p:extLst>
+      <p:ext uri="{BB962C8B-B14F-4D97-AF65-F5344CB8AC3E}">
+        <p14:creationId xmlns:p14="http://schemas.microsoft.com/office/powerpoint/2010/main" val="178401512"/>
+      </p:ext>
+    </p:extLst>
+  </p:cSld>
+  <p:clrMapOvr>
+    <a:masterClrMapping/>
+  </p:clrMapOvr>
+</p:sld>
+</file>
+
+<file path=ppt/slides/slide32.xml><?xml version="1.0" encoding="utf-8"?>
+<p:sld xmlns:a="http://schemas.openxmlformats.org/drawingml/2006/main" xmlns:r="http://schemas.openxmlformats.org/officeDocument/2006/relationships" xmlns:p="http://schemas.openxmlformats.org/presentationml/2006/main">
+  <p:cSld>
+    <p:spTree>
+      <p:nvGrpSpPr>
+        <p:cNvPr id="1" name=""/>
+        <p:cNvGrpSpPr/>
+        <p:nvPr/>
+      </p:nvGrpSpPr>
+      <p:grpSpPr>
+        <a:xfrm>
+          <a:off x="0" y="0"/>
+          <a:ext cx="0" cy="0"/>
+          <a:chOff x="0" y="0"/>
+          <a:chExt cx="0" cy="0"/>
+        </a:xfrm>
+      </p:grpSpPr>
+      <p:pic>
+        <p:nvPicPr>
+          <p:cNvPr id="4" name="Image 3">
+            <a:extLst>
+              <a:ext uri="{FF2B5EF4-FFF2-40B4-BE49-F238E27FC236}">
+                <a16:creationId xmlns:a16="http://schemas.microsoft.com/office/drawing/2014/main" id="{6D19BF79-1D71-48C5-80A2-A1D39A8C2714}"/>
+              </a:ext>
+            </a:extLst>
+          </p:cNvPr>
+          <p:cNvPicPr>
+            <a:picLocks noChangeAspect="1"/>
+          </p:cNvPicPr>
+          <p:nvPr/>
+        </p:nvPicPr>
+        <p:blipFill>
+          <a:blip r:embed="rId3">
+            <a:extLst>
+              <a:ext uri="{28A0092B-C50C-407E-A947-70E740481C1C}">
+                <a14:useLocalDpi xmlns:a14="http://schemas.microsoft.com/office/drawing/2010/main" val="0"/>
+              </a:ext>
+            </a:extLst>
+          </a:blip>
+          <a:stretch>
+            <a:fillRect/>
+          </a:stretch>
+        </p:blipFill>
+        <p:spPr>
+          <a:xfrm>
+            <a:off x="10769600" y="5435600"/>
+            <a:ext cx="1422400" cy="1422400"/>
+          </a:xfrm>
+          <a:prstGeom prst="rect">
+            <a:avLst/>
+          </a:prstGeom>
+        </p:spPr>
+      </p:pic>
       <p:sp>
         <p:nvSpPr>
           <p:cNvPr id="3" name="ZoneTexte 2">
@@ -14521,6 +15729,205 @@
               </a:rPr>
               <a:t>X</a:t>
             </a:r>
+          </a:p>
+        </p:txBody>
+      </p:sp>
+      <p:sp>
+        <p:nvSpPr>
+          <p:cNvPr id="5" name="Titre 1">
+            <a:extLst>
+              <a:ext uri="{FF2B5EF4-FFF2-40B4-BE49-F238E27FC236}">
+                <a16:creationId xmlns:a16="http://schemas.microsoft.com/office/drawing/2014/main" id="{F51BA96E-6AE0-407E-A12C-8E02D71FAD68}"/>
+              </a:ext>
+            </a:extLst>
+          </p:cNvPr>
+          <p:cNvSpPr>
+            <a:spLocks noGrp="1"/>
+          </p:cNvSpPr>
+          <p:nvPr>
+            <p:ph type="ctrTitle"/>
+          </p:nvPr>
+        </p:nvSpPr>
+        <p:spPr>
+          <a:xfrm>
+            <a:off x="524107" y="396240"/>
+            <a:ext cx="11229277" cy="1046481"/>
+          </a:xfrm>
+        </p:spPr>
+        <p:txBody>
+          <a:bodyPr>
+            <a:normAutofit/>
+          </a:bodyPr>
+          <a:lstStyle/>
+          <a:p>
+            <a:r>
+              <a:rPr lang="fr-FR" dirty="0"/>
+              <a:t>Amélioration du modèle</a:t>
+            </a:r>
+          </a:p>
+        </p:txBody>
+      </p:sp>
+      <p:pic>
+        <p:nvPicPr>
+          <p:cNvPr id="2" name="Image 1">
+            <a:extLst>
+              <a:ext uri="{FF2B5EF4-FFF2-40B4-BE49-F238E27FC236}">
+                <a16:creationId xmlns:a16="http://schemas.microsoft.com/office/drawing/2014/main" id="{BF8F712C-F686-4816-8BAD-C0D8861283FD}"/>
+              </a:ext>
+            </a:extLst>
+          </p:cNvPr>
+          <p:cNvPicPr>
+            <a:picLocks noChangeAspect="1"/>
+          </p:cNvPicPr>
+          <p:nvPr/>
+        </p:nvPicPr>
+        <p:blipFill>
+          <a:blip r:embed="rId4"/>
+          <a:stretch>
+            <a:fillRect/>
+          </a:stretch>
+        </p:blipFill>
+        <p:spPr>
+          <a:xfrm>
+            <a:off x="2262187" y="1457961"/>
+            <a:ext cx="7667625" cy="381000"/>
+          </a:xfrm>
+          <a:prstGeom prst="rect">
+            <a:avLst/>
+          </a:prstGeom>
+        </p:spPr>
+      </p:pic>
+      <p:pic>
+        <p:nvPicPr>
+          <p:cNvPr id="6" name="Image 5">
+            <a:extLst>
+              <a:ext uri="{FF2B5EF4-FFF2-40B4-BE49-F238E27FC236}">
+                <a16:creationId xmlns:a16="http://schemas.microsoft.com/office/drawing/2014/main" id="{3233AC41-3B92-4EC8-8A06-987CE8BB33DF}"/>
+              </a:ext>
+            </a:extLst>
+          </p:cNvPr>
+          <p:cNvPicPr>
+            <a:picLocks noChangeAspect="1"/>
+          </p:cNvPicPr>
+          <p:nvPr/>
+        </p:nvPicPr>
+        <p:blipFill>
+          <a:blip r:embed="rId5"/>
+          <a:stretch>
+            <a:fillRect/>
+          </a:stretch>
+        </p:blipFill>
+        <p:spPr>
+          <a:xfrm>
+            <a:off x="1386236" y="2555914"/>
+            <a:ext cx="9252027" cy="3590886"/>
+          </a:xfrm>
+          <a:prstGeom prst="rect">
+            <a:avLst/>
+          </a:prstGeom>
+        </p:spPr>
+      </p:pic>
+      <p:sp>
+        <p:nvSpPr>
+          <p:cNvPr id="7" name="Rectangle 6">
+            <a:extLst>
+              <a:ext uri="{FF2B5EF4-FFF2-40B4-BE49-F238E27FC236}">
+                <a16:creationId xmlns:a16="http://schemas.microsoft.com/office/drawing/2014/main" id="{4A64B508-AFD4-469A-A4C9-188EC5C40B1C}"/>
+              </a:ext>
+            </a:extLst>
+          </p:cNvPr>
+          <p:cNvSpPr/>
+          <p:nvPr/>
+        </p:nvSpPr>
+        <p:spPr>
+          <a:xfrm>
+            <a:off x="6017941" y="2996758"/>
+            <a:ext cx="4564567" cy="256478"/>
+          </a:xfrm>
+          <a:prstGeom prst="rect">
+            <a:avLst/>
+          </a:prstGeom>
+          <a:noFill/>
+          <a:ln>
+            <a:solidFill>
+              <a:srgbClr val="FF0000"/>
+            </a:solidFill>
+          </a:ln>
+        </p:spPr>
+        <p:style>
+          <a:lnRef idx="2">
+            <a:schemeClr val="accent1">
+              <a:shade val="50000"/>
+            </a:schemeClr>
+          </a:lnRef>
+          <a:fillRef idx="1">
+            <a:schemeClr val="accent1"/>
+          </a:fillRef>
+          <a:effectRef idx="0">
+            <a:schemeClr val="accent1"/>
+          </a:effectRef>
+          <a:fontRef idx="minor">
+            <a:schemeClr val="lt1"/>
+          </a:fontRef>
+        </p:style>
+        <p:txBody>
+          <a:bodyPr rtlCol="0" anchor="ctr"/>
+          <a:lstStyle/>
+          <a:p>
+            <a:pPr algn="ctr"/>
+            <a:endParaRPr lang="fr-FR"/>
+          </a:p>
+        </p:txBody>
+      </p:sp>
+      <p:sp>
+        <p:nvSpPr>
+          <p:cNvPr id="8" name="Rectangle 7">
+            <a:extLst>
+              <a:ext uri="{FF2B5EF4-FFF2-40B4-BE49-F238E27FC236}">
+                <a16:creationId xmlns:a16="http://schemas.microsoft.com/office/drawing/2014/main" id="{3595B2E0-EBF7-400D-87FD-7FA59DCAFD71}"/>
+              </a:ext>
+            </a:extLst>
+          </p:cNvPr>
+          <p:cNvSpPr/>
+          <p:nvPr/>
+        </p:nvSpPr>
+        <p:spPr>
+          <a:xfrm>
+            <a:off x="7159085" y="5118410"/>
+            <a:ext cx="680224" cy="1028389"/>
+          </a:xfrm>
+          <a:prstGeom prst="rect">
+            <a:avLst/>
+          </a:prstGeom>
+          <a:noFill/>
+          <a:ln>
+            <a:solidFill>
+              <a:srgbClr val="FF0000"/>
+            </a:solidFill>
+          </a:ln>
+        </p:spPr>
+        <p:style>
+          <a:lnRef idx="2">
+            <a:schemeClr val="accent1">
+              <a:shade val="50000"/>
+            </a:schemeClr>
+          </a:lnRef>
+          <a:fillRef idx="1">
+            <a:schemeClr val="accent1"/>
+          </a:fillRef>
+          <a:effectRef idx="0">
+            <a:schemeClr val="accent1"/>
+          </a:effectRef>
+          <a:fontRef idx="minor">
+            <a:schemeClr val="lt1"/>
+          </a:fontRef>
+        </p:style>
+        <p:txBody>
+          <a:bodyPr rtlCol="0" anchor="ctr"/>
+          <a:lstStyle/>
+          <a:p>
+            <a:pPr algn="ctr"/>
+            <a:endParaRPr lang="fr-FR"/>
           </a:p>
         </p:txBody>
       </p:sp>
@@ -14534,6 +15941,1496 @@
   <p:clrMapOvr>
     <a:masterClrMapping/>
   </p:clrMapOvr>
+</p:sld>
+</file>
+
+<file path=ppt/slides/slide33.xml><?xml version="1.0" encoding="utf-8"?>
+<p:sld xmlns:a="http://schemas.openxmlformats.org/drawingml/2006/main" xmlns:r="http://schemas.openxmlformats.org/officeDocument/2006/relationships" xmlns:p="http://schemas.openxmlformats.org/presentationml/2006/main">
+  <p:cSld>
+    <p:spTree>
+      <p:nvGrpSpPr>
+        <p:cNvPr id="1" name=""/>
+        <p:cNvGrpSpPr/>
+        <p:nvPr/>
+      </p:nvGrpSpPr>
+      <p:grpSpPr>
+        <a:xfrm>
+          <a:off x="0" y="0"/>
+          <a:ext cx="0" cy="0"/>
+          <a:chOff x="0" y="0"/>
+          <a:chExt cx="0" cy="0"/>
+        </a:xfrm>
+      </p:grpSpPr>
+      <p:pic>
+        <p:nvPicPr>
+          <p:cNvPr id="4" name="Image 3">
+            <a:extLst>
+              <a:ext uri="{FF2B5EF4-FFF2-40B4-BE49-F238E27FC236}">
+                <a16:creationId xmlns:a16="http://schemas.microsoft.com/office/drawing/2014/main" id="{6D19BF79-1D71-48C5-80A2-A1D39A8C2714}"/>
+              </a:ext>
+            </a:extLst>
+          </p:cNvPr>
+          <p:cNvPicPr>
+            <a:picLocks noChangeAspect="1"/>
+          </p:cNvPicPr>
+          <p:nvPr/>
+        </p:nvPicPr>
+        <p:blipFill>
+          <a:blip r:embed="rId3">
+            <a:extLst>
+              <a:ext uri="{28A0092B-C50C-407E-A947-70E740481C1C}">
+                <a14:useLocalDpi xmlns:a14="http://schemas.microsoft.com/office/drawing/2010/main" val="0"/>
+              </a:ext>
+            </a:extLst>
+          </a:blip>
+          <a:stretch>
+            <a:fillRect/>
+          </a:stretch>
+        </p:blipFill>
+        <p:spPr>
+          <a:xfrm>
+            <a:off x="10769600" y="5435600"/>
+            <a:ext cx="1422400" cy="1422400"/>
+          </a:xfrm>
+          <a:prstGeom prst="rect">
+            <a:avLst/>
+          </a:prstGeom>
+        </p:spPr>
+      </p:pic>
+      <p:sp>
+        <p:nvSpPr>
+          <p:cNvPr id="3" name="ZoneTexte 2">
+            <a:extLst>
+              <a:ext uri="{FF2B5EF4-FFF2-40B4-BE49-F238E27FC236}">
+                <a16:creationId xmlns:a16="http://schemas.microsoft.com/office/drawing/2014/main" id="{4D1D874D-CB32-4905-B31C-CF0033E1BCEC}"/>
+              </a:ext>
+            </a:extLst>
+          </p:cNvPr>
+          <p:cNvSpPr txBox="1"/>
+          <p:nvPr/>
+        </p:nvSpPr>
+        <p:spPr>
+          <a:xfrm>
+            <a:off x="311285" y="0"/>
+            <a:ext cx="566181" cy="923330"/>
+          </a:xfrm>
+          <a:prstGeom prst="rect">
+            <a:avLst/>
+          </a:prstGeom>
+          <a:noFill/>
+        </p:spPr>
+        <p:txBody>
+          <a:bodyPr wrap="none" rtlCol="0">
+            <a:spAutoFit/>
+          </a:bodyPr>
+          <a:lstStyle/>
+          <a:p>
+            <a:r>
+              <a:rPr lang="fr-FR" sz="5400" b="1" dirty="0">
+                <a:solidFill>
+                  <a:srgbClr val="FF0000"/>
+                </a:solidFill>
+              </a:rPr>
+              <a:t>X</a:t>
+            </a:r>
+          </a:p>
+        </p:txBody>
+      </p:sp>
+      <p:sp>
+        <p:nvSpPr>
+          <p:cNvPr id="7" name="Titre 1">
+            <a:extLst>
+              <a:ext uri="{FF2B5EF4-FFF2-40B4-BE49-F238E27FC236}">
+                <a16:creationId xmlns:a16="http://schemas.microsoft.com/office/drawing/2014/main" id="{30EC4AAD-8D22-4686-901D-C0BE9A5C4BB6}"/>
+              </a:ext>
+            </a:extLst>
+          </p:cNvPr>
+          <p:cNvSpPr>
+            <a:spLocks noGrp="1"/>
+          </p:cNvSpPr>
+          <p:nvPr>
+            <p:ph type="ctrTitle"/>
+          </p:nvPr>
+        </p:nvSpPr>
+        <p:spPr>
+          <a:xfrm>
+            <a:off x="524107" y="396240"/>
+            <a:ext cx="11229277" cy="1046481"/>
+          </a:xfrm>
+        </p:spPr>
+        <p:txBody>
+          <a:bodyPr>
+            <a:normAutofit/>
+          </a:bodyPr>
+          <a:lstStyle/>
+          <a:p>
+            <a:r>
+              <a:rPr lang="fr-FR" dirty="0"/>
+              <a:t>Régression linéaire avec logarithme </a:t>
+            </a:r>
+          </a:p>
+        </p:txBody>
+      </p:sp>
+      <p:pic>
+        <p:nvPicPr>
+          <p:cNvPr id="8" name="Image 7">
+            <a:extLst>
+              <a:ext uri="{FF2B5EF4-FFF2-40B4-BE49-F238E27FC236}">
+                <a16:creationId xmlns:a16="http://schemas.microsoft.com/office/drawing/2014/main" id="{5805071A-FB1B-41F6-8E9A-9D4F5F0B387A}"/>
+              </a:ext>
+            </a:extLst>
+          </p:cNvPr>
+          <p:cNvPicPr>
+            <a:picLocks noChangeAspect="1"/>
+          </p:cNvPicPr>
+          <p:nvPr/>
+        </p:nvPicPr>
+        <p:blipFill>
+          <a:blip r:embed="rId4"/>
+          <a:stretch>
+            <a:fillRect/>
+          </a:stretch>
+        </p:blipFill>
+        <p:spPr>
+          <a:xfrm>
+            <a:off x="1000125" y="1530151"/>
+            <a:ext cx="10191750" cy="352425"/>
+          </a:xfrm>
+          <a:prstGeom prst="rect">
+            <a:avLst/>
+          </a:prstGeom>
+        </p:spPr>
+      </p:pic>
+      <p:pic>
+        <p:nvPicPr>
+          <p:cNvPr id="9" name="Image 8">
+            <a:extLst>
+              <a:ext uri="{FF2B5EF4-FFF2-40B4-BE49-F238E27FC236}">
+                <a16:creationId xmlns:a16="http://schemas.microsoft.com/office/drawing/2014/main" id="{BDA78401-BE25-4A34-83FE-4D92EB580A81}"/>
+              </a:ext>
+            </a:extLst>
+          </p:cNvPr>
+          <p:cNvPicPr>
+            <a:picLocks noChangeAspect="1"/>
+          </p:cNvPicPr>
+          <p:nvPr/>
+        </p:nvPicPr>
+        <p:blipFill>
+          <a:blip r:embed="rId5"/>
+          <a:stretch>
+            <a:fillRect/>
+          </a:stretch>
+        </p:blipFill>
+        <p:spPr>
+          <a:xfrm>
+            <a:off x="1533461" y="2706699"/>
+            <a:ext cx="9125078" cy="3440101"/>
+          </a:xfrm>
+          <a:prstGeom prst="rect">
+            <a:avLst/>
+          </a:prstGeom>
+        </p:spPr>
+      </p:pic>
+      <p:sp>
+        <p:nvSpPr>
+          <p:cNvPr id="10" name="Rectangle 9">
+            <a:extLst>
+              <a:ext uri="{FF2B5EF4-FFF2-40B4-BE49-F238E27FC236}">
+                <a16:creationId xmlns:a16="http://schemas.microsoft.com/office/drawing/2014/main" id="{EE1EDCE4-7184-4CFE-963A-2A9F0F52EBAE}"/>
+              </a:ext>
+            </a:extLst>
+          </p:cNvPr>
+          <p:cNvSpPr/>
+          <p:nvPr/>
+        </p:nvSpPr>
+        <p:spPr>
+          <a:xfrm>
+            <a:off x="7638587" y="5093675"/>
+            <a:ext cx="680224" cy="1028389"/>
+          </a:xfrm>
+          <a:prstGeom prst="rect">
+            <a:avLst/>
+          </a:prstGeom>
+          <a:noFill/>
+          <a:ln>
+            <a:solidFill>
+              <a:srgbClr val="FF0000"/>
+            </a:solidFill>
+          </a:ln>
+        </p:spPr>
+        <p:style>
+          <a:lnRef idx="2">
+            <a:schemeClr val="accent1">
+              <a:shade val="50000"/>
+            </a:schemeClr>
+          </a:lnRef>
+          <a:fillRef idx="1">
+            <a:schemeClr val="accent1"/>
+          </a:fillRef>
+          <a:effectRef idx="0">
+            <a:schemeClr val="accent1"/>
+          </a:effectRef>
+          <a:fontRef idx="minor">
+            <a:schemeClr val="lt1"/>
+          </a:fontRef>
+        </p:style>
+        <p:txBody>
+          <a:bodyPr rtlCol="0" anchor="ctr"/>
+          <a:lstStyle/>
+          <a:p>
+            <a:pPr algn="ctr"/>
+            <a:endParaRPr lang="fr-FR"/>
+          </a:p>
+        </p:txBody>
+      </p:sp>
+      <p:sp>
+        <p:nvSpPr>
+          <p:cNvPr id="11" name="Rectangle 10">
+            <a:extLst>
+              <a:ext uri="{FF2B5EF4-FFF2-40B4-BE49-F238E27FC236}">
+                <a16:creationId xmlns:a16="http://schemas.microsoft.com/office/drawing/2014/main" id="{C9FA398C-6E3D-4A4D-AEF3-6D0EE1A0E20C}"/>
+              </a:ext>
+            </a:extLst>
+          </p:cNvPr>
+          <p:cNvSpPr/>
+          <p:nvPr/>
+        </p:nvSpPr>
+        <p:spPr>
+          <a:xfrm>
+            <a:off x="5356304" y="3274371"/>
+            <a:ext cx="3865756" cy="260566"/>
+          </a:xfrm>
+          <a:prstGeom prst="rect">
+            <a:avLst/>
+          </a:prstGeom>
+          <a:noFill/>
+          <a:ln>
+            <a:solidFill>
+              <a:srgbClr val="FF0000"/>
+            </a:solidFill>
+          </a:ln>
+        </p:spPr>
+        <p:style>
+          <a:lnRef idx="2">
+            <a:schemeClr val="accent1">
+              <a:shade val="50000"/>
+            </a:schemeClr>
+          </a:lnRef>
+          <a:fillRef idx="1">
+            <a:schemeClr val="accent1"/>
+          </a:fillRef>
+          <a:effectRef idx="0">
+            <a:schemeClr val="accent1"/>
+          </a:effectRef>
+          <a:fontRef idx="minor">
+            <a:schemeClr val="lt1"/>
+          </a:fontRef>
+        </p:style>
+        <p:txBody>
+          <a:bodyPr rtlCol="0" anchor="ctr"/>
+          <a:lstStyle/>
+          <a:p>
+            <a:pPr algn="ctr"/>
+            <a:endParaRPr lang="fr-FR"/>
+          </a:p>
+        </p:txBody>
+      </p:sp>
+    </p:spTree>
+    <p:extLst>
+      <p:ext uri="{BB962C8B-B14F-4D97-AF65-F5344CB8AC3E}">
+        <p14:creationId xmlns:p14="http://schemas.microsoft.com/office/powerpoint/2010/main" val="1431154264"/>
+      </p:ext>
+    </p:extLst>
+  </p:cSld>
+  <p:clrMapOvr>
+    <a:masterClrMapping/>
+  </p:clrMapOvr>
+</p:sld>
+</file>
+
+<file path=ppt/slides/slide34.xml><?xml version="1.0" encoding="utf-8"?>
+<p:sld xmlns:a="http://schemas.openxmlformats.org/drawingml/2006/main" xmlns:r="http://schemas.openxmlformats.org/officeDocument/2006/relationships" xmlns:p="http://schemas.openxmlformats.org/presentationml/2006/main">
+  <p:cSld>
+    <p:spTree>
+      <p:nvGrpSpPr>
+        <p:cNvPr id="1" name=""/>
+        <p:cNvGrpSpPr/>
+        <p:nvPr/>
+      </p:nvGrpSpPr>
+      <p:grpSpPr>
+        <a:xfrm>
+          <a:off x="0" y="0"/>
+          <a:ext cx="0" cy="0"/>
+          <a:chOff x="0" y="0"/>
+          <a:chExt cx="0" cy="0"/>
+        </a:xfrm>
+      </p:grpSpPr>
+      <p:pic>
+        <p:nvPicPr>
+          <p:cNvPr id="4" name="Image 3">
+            <a:extLst>
+              <a:ext uri="{FF2B5EF4-FFF2-40B4-BE49-F238E27FC236}">
+                <a16:creationId xmlns:a16="http://schemas.microsoft.com/office/drawing/2014/main" id="{6D19BF79-1D71-48C5-80A2-A1D39A8C2714}"/>
+              </a:ext>
+            </a:extLst>
+          </p:cNvPr>
+          <p:cNvPicPr>
+            <a:picLocks noChangeAspect="1"/>
+          </p:cNvPicPr>
+          <p:nvPr/>
+        </p:nvPicPr>
+        <p:blipFill>
+          <a:blip r:embed="rId3">
+            <a:extLst>
+              <a:ext uri="{28A0092B-C50C-407E-A947-70E740481C1C}">
+                <a14:useLocalDpi xmlns:a14="http://schemas.microsoft.com/office/drawing/2010/main" val="0"/>
+              </a:ext>
+            </a:extLst>
+          </a:blip>
+          <a:stretch>
+            <a:fillRect/>
+          </a:stretch>
+        </p:blipFill>
+        <p:spPr>
+          <a:xfrm>
+            <a:off x="10769600" y="5435600"/>
+            <a:ext cx="1422400" cy="1422400"/>
+          </a:xfrm>
+          <a:prstGeom prst="rect">
+            <a:avLst/>
+          </a:prstGeom>
+        </p:spPr>
+      </p:pic>
+      <p:sp>
+        <p:nvSpPr>
+          <p:cNvPr id="3" name="ZoneTexte 2">
+            <a:extLst>
+              <a:ext uri="{FF2B5EF4-FFF2-40B4-BE49-F238E27FC236}">
+                <a16:creationId xmlns:a16="http://schemas.microsoft.com/office/drawing/2014/main" id="{4D1D874D-CB32-4905-B31C-CF0033E1BCEC}"/>
+              </a:ext>
+            </a:extLst>
+          </p:cNvPr>
+          <p:cNvSpPr txBox="1"/>
+          <p:nvPr/>
+        </p:nvSpPr>
+        <p:spPr>
+          <a:xfrm>
+            <a:off x="311285" y="0"/>
+            <a:ext cx="566181" cy="923330"/>
+          </a:xfrm>
+          <a:prstGeom prst="rect">
+            <a:avLst/>
+          </a:prstGeom>
+          <a:noFill/>
+        </p:spPr>
+        <p:txBody>
+          <a:bodyPr wrap="none" rtlCol="0">
+            <a:spAutoFit/>
+          </a:bodyPr>
+          <a:lstStyle/>
+          <a:p>
+            <a:r>
+              <a:rPr lang="fr-FR" sz="5400" b="1" dirty="0">
+                <a:solidFill>
+                  <a:srgbClr val="FF0000"/>
+                </a:solidFill>
+              </a:rPr>
+              <a:t>X</a:t>
+            </a:r>
+          </a:p>
+        </p:txBody>
+      </p:sp>
+      <p:sp>
+        <p:nvSpPr>
+          <p:cNvPr id="5" name="Titre 1">
+            <a:extLst>
+              <a:ext uri="{FF2B5EF4-FFF2-40B4-BE49-F238E27FC236}">
+                <a16:creationId xmlns:a16="http://schemas.microsoft.com/office/drawing/2014/main" id="{F51BA96E-6AE0-407E-A12C-8E02D71FAD68}"/>
+              </a:ext>
+            </a:extLst>
+          </p:cNvPr>
+          <p:cNvSpPr>
+            <a:spLocks noGrp="1"/>
+          </p:cNvSpPr>
+          <p:nvPr>
+            <p:ph type="ctrTitle"/>
+          </p:nvPr>
+        </p:nvSpPr>
+        <p:spPr>
+          <a:xfrm>
+            <a:off x="524107" y="396240"/>
+            <a:ext cx="11229277" cy="1046481"/>
+          </a:xfrm>
+        </p:spPr>
+        <p:txBody>
+          <a:bodyPr>
+            <a:normAutofit/>
+          </a:bodyPr>
+          <a:lstStyle/>
+          <a:p>
+            <a:r>
+              <a:rPr lang="fr-FR" dirty="0"/>
+              <a:t>Amélioration du modèle</a:t>
+            </a:r>
+          </a:p>
+        </p:txBody>
+      </p:sp>
+      <p:pic>
+        <p:nvPicPr>
+          <p:cNvPr id="9" name="Image 8">
+            <a:extLst>
+              <a:ext uri="{FF2B5EF4-FFF2-40B4-BE49-F238E27FC236}">
+                <a16:creationId xmlns:a16="http://schemas.microsoft.com/office/drawing/2014/main" id="{04923DF3-921F-4954-87A4-1310A95BF4D0}"/>
+              </a:ext>
+            </a:extLst>
+          </p:cNvPr>
+          <p:cNvPicPr>
+            <a:picLocks noChangeAspect="1"/>
+          </p:cNvPicPr>
+          <p:nvPr/>
+        </p:nvPicPr>
+        <p:blipFill>
+          <a:blip r:embed="rId4"/>
+          <a:stretch>
+            <a:fillRect/>
+          </a:stretch>
+        </p:blipFill>
+        <p:spPr>
+          <a:xfrm>
+            <a:off x="1557337" y="1442721"/>
+            <a:ext cx="9077325" cy="542925"/>
+          </a:xfrm>
+          <a:prstGeom prst="rect">
+            <a:avLst/>
+          </a:prstGeom>
+        </p:spPr>
+      </p:pic>
+      <p:pic>
+        <p:nvPicPr>
+          <p:cNvPr id="10" name="Image 9">
+            <a:extLst>
+              <a:ext uri="{FF2B5EF4-FFF2-40B4-BE49-F238E27FC236}">
+                <a16:creationId xmlns:a16="http://schemas.microsoft.com/office/drawing/2014/main" id="{254D22F7-C763-4BDB-AABE-21EBEC72B54E}"/>
+              </a:ext>
+            </a:extLst>
+          </p:cNvPr>
+          <p:cNvPicPr>
+            <a:picLocks noChangeAspect="1"/>
+          </p:cNvPicPr>
+          <p:nvPr/>
+        </p:nvPicPr>
+        <p:blipFill>
+          <a:blip r:embed="rId5"/>
+          <a:stretch>
+            <a:fillRect/>
+          </a:stretch>
+        </p:blipFill>
+        <p:spPr>
+          <a:xfrm>
+            <a:off x="1600082" y="2806957"/>
+            <a:ext cx="9077326" cy="3339843"/>
+          </a:xfrm>
+          <a:prstGeom prst="rect">
+            <a:avLst/>
+          </a:prstGeom>
+        </p:spPr>
+      </p:pic>
+      <p:sp>
+        <p:nvSpPr>
+          <p:cNvPr id="11" name="Rectangle 10">
+            <a:extLst>
+              <a:ext uri="{FF2B5EF4-FFF2-40B4-BE49-F238E27FC236}">
+                <a16:creationId xmlns:a16="http://schemas.microsoft.com/office/drawing/2014/main" id="{DF0B3EAE-2029-45ED-9FD7-1FC84C71B26C}"/>
+              </a:ext>
+            </a:extLst>
+          </p:cNvPr>
+          <p:cNvSpPr/>
+          <p:nvPr/>
+        </p:nvSpPr>
+        <p:spPr>
+          <a:xfrm>
+            <a:off x="5356304" y="3134981"/>
+            <a:ext cx="3865756" cy="260566"/>
+          </a:xfrm>
+          <a:prstGeom prst="rect">
+            <a:avLst/>
+          </a:prstGeom>
+          <a:noFill/>
+          <a:ln>
+            <a:solidFill>
+              <a:srgbClr val="FF0000"/>
+            </a:solidFill>
+          </a:ln>
+        </p:spPr>
+        <p:style>
+          <a:lnRef idx="2">
+            <a:schemeClr val="accent1">
+              <a:shade val="50000"/>
+            </a:schemeClr>
+          </a:lnRef>
+          <a:fillRef idx="1">
+            <a:schemeClr val="accent1"/>
+          </a:fillRef>
+          <a:effectRef idx="0">
+            <a:schemeClr val="accent1"/>
+          </a:effectRef>
+          <a:fontRef idx="minor">
+            <a:schemeClr val="lt1"/>
+          </a:fontRef>
+        </p:style>
+        <p:txBody>
+          <a:bodyPr rtlCol="0" anchor="ctr"/>
+          <a:lstStyle/>
+          <a:p>
+            <a:pPr algn="ctr"/>
+            <a:endParaRPr lang="fr-FR"/>
+          </a:p>
+        </p:txBody>
+      </p:sp>
+      <p:sp>
+        <p:nvSpPr>
+          <p:cNvPr id="12" name="Rectangle 11">
+            <a:extLst>
+              <a:ext uri="{FF2B5EF4-FFF2-40B4-BE49-F238E27FC236}">
+                <a16:creationId xmlns:a16="http://schemas.microsoft.com/office/drawing/2014/main" id="{16EE9DB4-A4FD-4CD5-AD9A-3B9B6FE0E31B}"/>
+              </a:ext>
+            </a:extLst>
+          </p:cNvPr>
+          <p:cNvSpPr/>
+          <p:nvPr/>
+        </p:nvSpPr>
+        <p:spPr>
+          <a:xfrm>
+            <a:off x="7716644" y="4850781"/>
+            <a:ext cx="680224" cy="1271284"/>
+          </a:xfrm>
+          <a:prstGeom prst="rect">
+            <a:avLst/>
+          </a:prstGeom>
+          <a:noFill/>
+          <a:ln>
+            <a:solidFill>
+              <a:srgbClr val="FF0000"/>
+            </a:solidFill>
+          </a:ln>
+        </p:spPr>
+        <p:style>
+          <a:lnRef idx="2">
+            <a:schemeClr val="accent1">
+              <a:shade val="50000"/>
+            </a:schemeClr>
+          </a:lnRef>
+          <a:fillRef idx="1">
+            <a:schemeClr val="accent1"/>
+          </a:fillRef>
+          <a:effectRef idx="0">
+            <a:schemeClr val="accent1"/>
+          </a:effectRef>
+          <a:fontRef idx="minor">
+            <a:schemeClr val="lt1"/>
+          </a:fontRef>
+        </p:style>
+        <p:txBody>
+          <a:bodyPr rtlCol="0" anchor="ctr"/>
+          <a:lstStyle/>
+          <a:p>
+            <a:pPr algn="ctr"/>
+            <a:endParaRPr lang="fr-FR"/>
+          </a:p>
+        </p:txBody>
+      </p:sp>
+    </p:spTree>
+    <p:extLst>
+      <p:ext uri="{BB962C8B-B14F-4D97-AF65-F5344CB8AC3E}">
+        <p14:creationId xmlns:p14="http://schemas.microsoft.com/office/powerpoint/2010/main" val="422927011"/>
+      </p:ext>
+    </p:extLst>
+  </p:cSld>
+  <p:clrMapOvr>
+    <a:masterClrMapping/>
+  </p:clrMapOvr>
+</p:sld>
+</file>
+
+<file path=ppt/slides/slide35.xml><?xml version="1.0" encoding="utf-8"?>
+<p:sld xmlns:a="http://schemas.openxmlformats.org/drawingml/2006/main" xmlns:r="http://schemas.openxmlformats.org/officeDocument/2006/relationships" xmlns:p="http://schemas.openxmlformats.org/presentationml/2006/main">
+  <p:cSld>
+    <p:spTree>
+      <p:nvGrpSpPr>
+        <p:cNvPr id="1" name=""/>
+        <p:cNvGrpSpPr/>
+        <p:nvPr/>
+      </p:nvGrpSpPr>
+      <p:grpSpPr>
+        <a:xfrm>
+          <a:off x="0" y="0"/>
+          <a:ext cx="0" cy="0"/>
+          <a:chOff x="0" y="0"/>
+          <a:chExt cx="0" cy="0"/>
+        </a:xfrm>
+      </p:grpSpPr>
+      <p:pic>
+        <p:nvPicPr>
+          <p:cNvPr id="4" name="Image 3">
+            <a:extLst>
+              <a:ext uri="{FF2B5EF4-FFF2-40B4-BE49-F238E27FC236}">
+                <a16:creationId xmlns:a16="http://schemas.microsoft.com/office/drawing/2014/main" id="{6D19BF79-1D71-48C5-80A2-A1D39A8C2714}"/>
+              </a:ext>
+            </a:extLst>
+          </p:cNvPr>
+          <p:cNvPicPr>
+            <a:picLocks noChangeAspect="1"/>
+          </p:cNvPicPr>
+          <p:nvPr/>
+        </p:nvPicPr>
+        <p:blipFill>
+          <a:blip r:embed="rId3">
+            <a:extLst>
+              <a:ext uri="{28A0092B-C50C-407E-A947-70E740481C1C}">
+                <a14:useLocalDpi xmlns:a14="http://schemas.microsoft.com/office/drawing/2010/main" val="0"/>
+              </a:ext>
+            </a:extLst>
+          </a:blip>
+          <a:stretch>
+            <a:fillRect/>
+          </a:stretch>
+        </p:blipFill>
+        <p:spPr>
+          <a:xfrm>
+            <a:off x="10769600" y="5435600"/>
+            <a:ext cx="1422400" cy="1422400"/>
+          </a:xfrm>
+          <a:prstGeom prst="rect">
+            <a:avLst/>
+          </a:prstGeom>
+        </p:spPr>
+      </p:pic>
+      <p:sp>
+        <p:nvSpPr>
+          <p:cNvPr id="3" name="ZoneTexte 2">
+            <a:extLst>
+              <a:ext uri="{FF2B5EF4-FFF2-40B4-BE49-F238E27FC236}">
+                <a16:creationId xmlns:a16="http://schemas.microsoft.com/office/drawing/2014/main" id="{4D1D874D-CB32-4905-B31C-CF0033E1BCEC}"/>
+              </a:ext>
+            </a:extLst>
+          </p:cNvPr>
+          <p:cNvSpPr txBox="1"/>
+          <p:nvPr/>
+        </p:nvSpPr>
+        <p:spPr>
+          <a:xfrm>
+            <a:off x="311285" y="0"/>
+            <a:ext cx="566181" cy="923330"/>
+          </a:xfrm>
+          <a:prstGeom prst="rect">
+            <a:avLst/>
+          </a:prstGeom>
+          <a:noFill/>
+        </p:spPr>
+        <p:txBody>
+          <a:bodyPr wrap="none" rtlCol="0">
+            <a:spAutoFit/>
+          </a:bodyPr>
+          <a:lstStyle/>
+          <a:p>
+            <a:r>
+              <a:rPr lang="fr-FR" sz="5400" b="1" dirty="0">
+                <a:solidFill>
+                  <a:srgbClr val="FF0000"/>
+                </a:solidFill>
+              </a:rPr>
+              <a:t>X</a:t>
+            </a:r>
+          </a:p>
+        </p:txBody>
+      </p:sp>
+      <p:sp>
+        <p:nvSpPr>
+          <p:cNvPr id="5" name="Titre 1">
+            <a:extLst>
+              <a:ext uri="{FF2B5EF4-FFF2-40B4-BE49-F238E27FC236}">
+                <a16:creationId xmlns:a16="http://schemas.microsoft.com/office/drawing/2014/main" id="{F51BA96E-6AE0-407E-A12C-8E02D71FAD68}"/>
+              </a:ext>
+            </a:extLst>
+          </p:cNvPr>
+          <p:cNvSpPr>
+            <a:spLocks noGrp="1"/>
+          </p:cNvSpPr>
+          <p:nvPr>
+            <p:ph type="ctrTitle"/>
+          </p:nvPr>
+        </p:nvSpPr>
+        <p:spPr>
+          <a:xfrm>
+            <a:off x="524107" y="396240"/>
+            <a:ext cx="11229277" cy="1046481"/>
+          </a:xfrm>
+        </p:spPr>
+        <p:txBody>
+          <a:bodyPr>
+            <a:normAutofit/>
+          </a:bodyPr>
+          <a:lstStyle/>
+          <a:p>
+            <a:r>
+              <a:rPr lang="fr-FR" dirty="0"/>
+              <a:t>Analyse des résultats</a:t>
+            </a:r>
+          </a:p>
+        </p:txBody>
+      </p:sp>
+      <p:pic>
+        <p:nvPicPr>
+          <p:cNvPr id="2" name="Image 1">
+            <a:extLst>
+              <a:ext uri="{FF2B5EF4-FFF2-40B4-BE49-F238E27FC236}">
+                <a16:creationId xmlns:a16="http://schemas.microsoft.com/office/drawing/2014/main" id="{3EE14184-3F77-4263-BA70-AFC170793C0B}"/>
+              </a:ext>
+            </a:extLst>
+          </p:cNvPr>
+          <p:cNvPicPr>
+            <a:picLocks noChangeAspect="1"/>
+          </p:cNvPicPr>
+          <p:nvPr/>
+        </p:nvPicPr>
+        <p:blipFill>
+          <a:blip r:embed="rId4"/>
+          <a:stretch>
+            <a:fillRect/>
+          </a:stretch>
+        </p:blipFill>
+        <p:spPr>
+          <a:xfrm>
+            <a:off x="2509837" y="2514600"/>
+            <a:ext cx="7172325" cy="1828800"/>
+          </a:xfrm>
+          <a:prstGeom prst="rect">
+            <a:avLst/>
+          </a:prstGeom>
+        </p:spPr>
+      </p:pic>
+      <p:sp>
+        <p:nvSpPr>
+          <p:cNvPr id="6" name="ZoneTexte 5">
+            <a:extLst>
+              <a:ext uri="{FF2B5EF4-FFF2-40B4-BE49-F238E27FC236}">
+                <a16:creationId xmlns:a16="http://schemas.microsoft.com/office/drawing/2014/main" id="{A0CA7BE3-BBEE-4CA1-944D-58F7245464FE}"/>
+              </a:ext>
+            </a:extLst>
+          </p:cNvPr>
+          <p:cNvSpPr txBox="1"/>
+          <p:nvPr/>
+        </p:nvSpPr>
+        <p:spPr>
+          <a:xfrm>
+            <a:off x="877466" y="1838961"/>
+            <a:ext cx="3131178" cy="369332"/>
+          </a:xfrm>
+          <a:prstGeom prst="rect">
+            <a:avLst/>
+          </a:prstGeom>
+          <a:noFill/>
+        </p:spPr>
+        <p:txBody>
+          <a:bodyPr wrap="none" rtlCol="0">
+            <a:spAutoFit/>
+          </a:bodyPr>
+          <a:lstStyle/>
+          <a:p>
+            <a:r>
+              <a:rPr lang="fr-FR" dirty="0"/>
+              <a:t>Colinéarité entre les variables : </a:t>
+            </a:r>
+          </a:p>
+        </p:txBody>
+      </p:sp>
+      <p:sp>
+        <p:nvSpPr>
+          <p:cNvPr id="7" name="ZoneTexte 6">
+            <a:extLst>
+              <a:ext uri="{FF2B5EF4-FFF2-40B4-BE49-F238E27FC236}">
+                <a16:creationId xmlns:a16="http://schemas.microsoft.com/office/drawing/2014/main" id="{70719907-03CF-4F67-B2FC-1DF6E60FB7C0}"/>
+              </a:ext>
+            </a:extLst>
+          </p:cNvPr>
+          <p:cNvSpPr txBox="1"/>
+          <p:nvPr/>
+        </p:nvSpPr>
+        <p:spPr>
+          <a:xfrm>
+            <a:off x="4530410" y="4802655"/>
+            <a:ext cx="3614259" cy="369332"/>
+          </a:xfrm>
+          <a:prstGeom prst="rect">
+            <a:avLst/>
+          </a:prstGeom>
+          <a:noFill/>
+        </p:spPr>
+        <p:txBody>
+          <a:bodyPr wrap="none" rtlCol="0">
+            <a:spAutoFit/>
+          </a:bodyPr>
+          <a:lstStyle/>
+          <a:p>
+            <a:r>
+              <a:rPr lang="fr-FR" dirty="0"/>
+              <a:t>Les variables ne sont pas colinéaires</a:t>
+            </a:r>
+          </a:p>
+        </p:txBody>
+      </p:sp>
+    </p:spTree>
+    <p:extLst>
+      <p:ext uri="{BB962C8B-B14F-4D97-AF65-F5344CB8AC3E}">
+        <p14:creationId xmlns:p14="http://schemas.microsoft.com/office/powerpoint/2010/main" val="2461484588"/>
+      </p:ext>
+    </p:extLst>
+  </p:cSld>
+  <p:clrMapOvr>
+    <a:masterClrMapping/>
+  </p:clrMapOvr>
+  <p:timing>
+    <p:tnLst>
+      <p:par>
+        <p:cTn id="1" dur="indefinite" restart="never" nodeType="tmRoot">
+          <p:childTnLst>
+            <p:seq concurrent="1" nextAc="seek">
+              <p:cTn id="2" dur="indefinite" nodeType="mainSeq">
+                <p:childTnLst>
+                  <p:par>
+                    <p:cTn id="3" fill="hold">
+                      <p:stCondLst>
+                        <p:cond delay="indefinite"/>
+                      </p:stCondLst>
+                      <p:childTnLst>
+                        <p:par>
+                          <p:cTn id="4" fill="hold">
+                            <p:stCondLst>
+                              <p:cond delay="0"/>
+                            </p:stCondLst>
+                            <p:childTnLst>
+                              <p:par>
+                                <p:cTn id="5" presetID="1" presetClass="entr" presetSubtype="0" fill="hold" grpId="0" nodeType="clickEffect">
+                                  <p:stCondLst>
+                                    <p:cond delay="0"/>
+                                  </p:stCondLst>
+                                  <p:childTnLst>
+                                    <p:set>
+                                      <p:cBhvr>
+                                        <p:cTn id="6" dur="1" fill="hold">
+                                          <p:stCondLst>
+                                            <p:cond delay="0"/>
+                                          </p:stCondLst>
+                                        </p:cTn>
+                                        <p:tgtEl>
+                                          <p:spTgt spid="7"/>
+                                        </p:tgtEl>
+                                        <p:attrNameLst>
+                                          <p:attrName>style.visibility</p:attrName>
+                                        </p:attrNameLst>
+                                      </p:cBhvr>
+                                      <p:to>
+                                        <p:strVal val="visible"/>
+                                      </p:to>
+                                    </p:set>
+                                  </p:childTnLst>
+                                </p:cTn>
+                              </p:par>
+                            </p:childTnLst>
+                          </p:cTn>
+                        </p:par>
+                      </p:childTnLst>
+                    </p:cTn>
+                  </p:par>
+                </p:childTnLst>
+              </p:cTn>
+              <p:prevCondLst>
+                <p:cond evt="onPrev" delay="0">
+                  <p:tgtEl>
+                    <p:sldTgt/>
+                  </p:tgtEl>
+                </p:cond>
+              </p:prevCondLst>
+              <p:nextCondLst>
+                <p:cond evt="onNext" delay="0">
+                  <p:tgtEl>
+                    <p:sldTgt/>
+                  </p:tgtEl>
+                </p:cond>
+              </p:nextCondLst>
+            </p:seq>
+          </p:childTnLst>
+        </p:cTn>
+      </p:par>
+    </p:tnLst>
+    <p:bldLst>
+      <p:bldP spid="7" grpId="0"/>
+    </p:bldLst>
+  </p:timing>
+</p:sld>
+</file>
+
+<file path=ppt/slides/slide36.xml><?xml version="1.0" encoding="utf-8"?>
+<p:sld xmlns:a="http://schemas.openxmlformats.org/drawingml/2006/main" xmlns:r="http://schemas.openxmlformats.org/officeDocument/2006/relationships" xmlns:p="http://schemas.openxmlformats.org/presentationml/2006/main">
+  <p:cSld>
+    <p:spTree>
+      <p:nvGrpSpPr>
+        <p:cNvPr id="1" name=""/>
+        <p:cNvGrpSpPr/>
+        <p:nvPr/>
+      </p:nvGrpSpPr>
+      <p:grpSpPr>
+        <a:xfrm>
+          <a:off x="0" y="0"/>
+          <a:ext cx="0" cy="0"/>
+          <a:chOff x="0" y="0"/>
+          <a:chExt cx="0" cy="0"/>
+        </a:xfrm>
+      </p:grpSpPr>
+      <p:pic>
+        <p:nvPicPr>
+          <p:cNvPr id="4" name="Image 3">
+            <a:extLst>
+              <a:ext uri="{FF2B5EF4-FFF2-40B4-BE49-F238E27FC236}">
+                <a16:creationId xmlns:a16="http://schemas.microsoft.com/office/drawing/2014/main" id="{6D19BF79-1D71-48C5-80A2-A1D39A8C2714}"/>
+              </a:ext>
+            </a:extLst>
+          </p:cNvPr>
+          <p:cNvPicPr>
+            <a:picLocks noChangeAspect="1"/>
+          </p:cNvPicPr>
+          <p:nvPr/>
+        </p:nvPicPr>
+        <p:blipFill>
+          <a:blip r:embed="rId3">
+            <a:extLst>
+              <a:ext uri="{28A0092B-C50C-407E-A947-70E740481C1C}">
+                <a14:useLocalDpi xmlns:a14="http://schemas.microsoft.com/office/drawing/2010/main" val="0"/>
+              </a:ext>
+            </a:extLst>
+          </a:blip>
+          <a:stretch>
+            <a:fillRect/>
+          </a:stretch>
+        </p:blipFill>
+        <p:spPr>
+          <a:xfrm>
+            <a:off x="10769600" y="5435600"/>
+            <a:ext cx="1422400" cy="1422400"/>
+          </a:xfrm>
+          <a:prstGeom prst="rect">
+            <a:avLst/>
+          </a:prstGeom>
+        </p:spPr>
+      </p:pic>
+      <p:sp>
+        <p:nvSpPr>
+          <p:cNvPr id="3" name="ZoneTexte 2">
+            <a:extLst>
+              <a:ext uri="{FF2B5EF4-FFF2-40B4-BE49-F238E27FC236}">
+                <a16:creationId xmlns:a16="http://schemas.microsoft.com/office/drawing/2014/main" id="{4D1D874D-CB32-4905-B31C-CF0033E1BCEC}"/>
+              </a:ext>
+            </a:extLst>
+          </p:cNvPr>
+          <p:cNvSpPr txBox="1"/>
+          <p:nvPr/>
+        </p:nvSpPr>
+        <p:spPr>
+          <a:xfrm>
+            <a:off x="311285" y="0"/>
+            <a:ext cx="566181" cy="923330"/>
+          </a:xfrm>
+          <a:prstGeom prst="rect">
+            <a:avLst/>
+          </a:prstGeom>
+          <a:noFill/>
+        </p:spPr>
+        <p:txBody>
+          <a:bodyPr wrap="none" rtlCol="0">
+            <a:spAutoFit/>
+          </a:bodyPr>
+          <a:lstStyle/>
+          <a:p>
+            <a:r>
+              <a:rPr lang="fr-FR" sz="5400" b="1" dirty="0">
+                <a:solidFill>
+                  <a:srgbClr val="FF0000"/>
+                </a:solidFill>
+              </a:rPr>
+              <a:t>X</a:t>
+            </a:r>
+          </a:p>
+        </p:txBody>
+      </p:sp>
+      <p:sp>
+        <p:nvSpPr>
+          <p:cNvPr id="5" name="Titre 1">
+            <a:extLst>
+              <a:ext uri="{FF2B5EF4-FFF2-40B4-BE49-F238E27FC236}">
+                <a16:creationId xmlns:a16="http://schemas.microsoft.com/office/drawing/2014/main" id="{F51BA96E-6AE0-407E-A12C-8E02D71FAD68}"/>
+              </a:ext>
+            </a:extLst>
+          </p:cNvPr>
+          <p:cNvSpPr>
+            <a:spLocks noGrp="1"/>
+          </p:cNvSpPr>
+          <p:nvPr>
+            <p:ph type="ctrTitle"/>
+          </p:nvPr>
+        </p:nvSpPr>
+        <p:spPr>
+          <a:xfrm>
+            <a:off x="524107" y="396240"/>
+            <a:ext cx="11229277" cy="1046481"/>
+          </a:xfrm>
+        </p:spPr>
+        <p:txBody>
+          <a:bodyPr>
+            <a:normAutofit/>
+          </a:bodyPr>
+          <a:lstStyle/>
+          <a:p>
+            <a:r>
+              <a:rPr lang="fr-FR" dirty="0"/>
+              <a:t>Analyse des résultats</a:t>
+            </a:r>
+          </a:p>
+        </p:txBody>
+      </p:sp>
+      <p:sp>
+        <p:nvSpPr>
+          <p:cNvPr id="6" name="ZoneTexte 5">
+            <a:extLst>
+              <a:ext uri="{FF2B5EF4-FFF2-40B4-BE49-F238E27FC236}">
+                <a16:creationId xmlns:a16="http://schemas.microsoft.com/office/drawing/2014/main" id="{A0CA7BE3-BBEE-4CA1-944D-58F7245464FE}"/>
+              </a:ext>
+            </a:extLst>
+          </p:cNvPr>
+          <p:cNvSpPr txBox="1"/>
+          <p:nvPr/>
+        </p:nvSpPr>
+        <p:spPr>
+          <a:xfrm>
+            <a:off x="877466" y="1838961"/>
+            <a:ext cx="2396105" cy="369332"/>
+          </a:xfrm>
+          <a:prstGeom prst="rect">
+            <a:avLst/>
+          </a:prstGeom>
+          <a:noFill/>
+        </p:spPr>
+        <p:txBody>
+          <a:bodyPr wrap="none" rtlCol="0">
+            <a:spAutoFit/>
+          </a:bodyPr>
+          <a:lstStyle/>
+          <a:p>
+            <a:r>
+              <a:rPr lang="fr-FR" dirty="0"/>
+              <a:t>Normalité des résidus : </a:t>
+            </a:r>
+          </a:p>
+        </p:txBody>
+      </p:sp>
+      <p:sp>
+        <p:nvSpPr>
+          <p:cNvPr id="7" name="ZoneTexte 6">
+            <a:extLst>
+              <a:ext uri="{FF2B5EF4-FFF2-40B4-BE49-F238E27FC236}">
+                <a16:creationId xmlns:a16="http://schemas.microsoft.com/office/drawing/2014/main" id="{70719907-03CF-4F67-B2FC-1DF6E60FB7C0}"/>
+              </a:ext>
+            </a:extLst>
+          </p:cNvPr>
+          <p:cNvSpPr txBox="1"/>
+          <p:nvPr/>
+        </p:nvSpPr>
+        <p:spPr>
+          <a:xfrm>
+            <a:off x="4127030" y="4807120"/>
+            <a:ext cx="3937938" cy="369332"/>
+          </a:xfrm>
+          <a:prstGeom prst="rect">
+            <a:avLst/>
+          </a:prstGeom>
+          <a:noFill/>
+        </p:spPr>
+        <p:txBody>
+          <a:bodyPr wrap="none" rtlCol="0">
+            <a:spAutoFit/>
+          </a:bodyPr>
+          <a:lstStyle/>
+          <a:p>
+            <a:r>
+              <a:rPr lang="fr-FR" dirty="0"/>
+              <a:t>Les résidus suivent bien une loi normale</a:t>
+            </a:r>
+          </a:p>
+        </p:txBody>
+      </p:sp>
+      <p:pic>
+        <p:nvPicPr>
+          <p:cNvPr id="8" name="Image 7">
+            <a:extLst>
+              <a:ext uri="{FF2B5EF4-FFF2-40B4-BE49-F238E27FC236}">
+                <a16:creationId xmlns:a16="http://schemas.microsoft.com/office/drawing/2014/main" id="{8375D330-002E-483D-A0FA-28E88D2DEEBD}"/>
+              </a:ext>
+            </a:extLst>
+          </p:cNvPr>
+          <p:cNvPicPr>
+            <a:picLocks noChangeAspect="1"/>
+          </p:cNvPicPr>
+          <p:nvPr/>
+        </p:nvPicPr>
+        <p:blipFill>
+          <a:blip r:embed="rId4"/>
+          <a:stretch>
+            <a:fillRect/>
+          </a:stretch>
+        </p:blipFill>
+        <p:spPr>
+          <a:xfrm>
+            <a:off x="3624262" y="2581910"/>
+            <a:ext cx="4943475" cy="571500"/>
+          </a:xfrm>
+          <a:prstGeom prst="rect">
+            <a:avLst/>
+          </a:prstGeom>
+        </p:spPr>
+      </p:pic>
+      <p:sp>
+        <p:nvSpPr>
+          <p:cNvPr id="10" name="ZoneTexte 9">
+            <a:extLst>
+              <a:ext uri="{FF2B5EF4-FFF2-40B4-BE49-F238E27FC236}">
+                <a16:creationId xmlns:a16="http://schemas.microsoft.com/office/drawing/2014/main" id="{CAE4055F-21DE-4E2D-86FB-68B980953283}"/>
+              </a:ext>
+            </a:extLst>
+          </p:cNvPr>
+          <p:cNvSpPr txBox="1"/>
+          <p:nvPr/>
+        </p:nvSpPr>
+        <p:spPr>
+          <a:xfrm>
+            <a:off x="3679834" y="3518600"/>
+            <a:ext cx="4917821" cy="923330"/>
+          </a:xfrm>
+          <a:prstGeom prst="rect">
+            <a:avLst/>
+          </a:prstGeom>
+          <a:noFill/>
+        </p:spPr>
+        <p:txBody>
+          <a:bodyPr wrap="none" rtlCol="0">
+            <a:spAutoFit/>
+          </a:bodyPr>
+          <a:lstStyle/>
+          <a:p>
+            <a:r>
+              <a:rPr lang="en-US" dirty="0"/>
+              <a:t>statistic=233667.2212877213</a:t>
+            </a:r>
+          </a:p>
+          <a:p>
+            <a:r>
+              <a:rPr lang="en-US" dirty="0"/>
+              <a:t>Critical values= [0.576, 0.656, 0.787, 0.918, 1.092]</a:t>
+            </a:r>
+          </a:p>
+          <a:p>
+            <a:r>
+              <a:rPr lang="en-US" dirty="0"/>
+              <a:t>Significance level = [15. , 10. , 5. , 2.5, 1. ]</a:t>
+            </a:r>
+          </a:p>
+        </p:txBody>
+      </p:sp>
+      <p:sp>
+        <p:nvSpPr>
+          <p:cNvPr id="11" name="Rectangle 10">
+            <a:extLst>
+              <a:ext uri="{FF2B5EF4-FFF2-40B4-BE49-F238E27FC236}">
+                <a16:creationId xmlns:a16="http://schemas.microsoft.com/office/drawing/2014/main" id="{16B5328C-A63F-4C3B-9993-4D16A72B8161}"/>
+              </a:ext>
+            </a:extLst>
+          </p:cNvPr>
+          <p:cNvSpPr/>
+          <p:nvPr/>
+        </p:nvSpPr>
+        <p:spPr>
+          <a:xfrm>
+            <a:off x="4574610" y="3599234"/>
+            <a:ext cx="1933194" cy="210398"/>
+          </a:xfrm>
+          <a:prstGeom prst="rect">
+            <a:avLst/>
+          </a:prstGeom>
+          <a:noFill/>
+          <a:ln>
+            <a:solidFill>
+              <a:srgbClr val="FF0000"/>
+            </a:solidFill>
+          </a:ln>
+        </p:spPr>
+        <p:style>
+          <a:lnRef idx="2">
+            <a:schemeClr val="accent1">
+              <a:shade val="50000"/>
+            </a:schemeClr>
+          </a:lnRef>
+          <a:fillRef idx="1">
+            <a:schemeClr val="accent1"/>
+          </a:fillRef>
+          <a:effectRef idx="0">
+            <a:schemeClr val="accent1"/>
+          </a:effectRef>
+          <a:fontRef idx="minor">
+            <a:schemeClr val="lt1"/>
+          </a:fontRef>
+        </p:style>
+        <p:txBody>
+          <a:bodyPr rtlCol="0" anchor="ctr"/>
+          <a:lstStyle/>
+          <a:p>
+            <a:pPr algn="ctr"/>
+            <a:endParaRPr lang="fr-FR"/>
+          </a:p>
+        </p:txBody>
+      </p:sp>
+      <p:sp>
+        <p:nvSpPr>
+          <p:cNvPr id="12" name="Rectangle 11">
+            <a:extLst>
+              <a:ext uri="{FF2B5EF4-FFF2-40B4-BE49-F238E27FC236}">
+                <a16:creationId xmlns:a16="http://schemas.microsoft.com/office/drawing/2014/main" id="{6699FA2E-612C-44B3-83F3-92D5272F5112}"/>
+              </a:ext>
+            </a:extLst>
+          </p:cNvPr>
+          <p:cNvSpPr/>
+          <p:nvPr/>
+        </p:nvSpPr>
+        <p:spPr>
+          <a:xfrm>
+            <a:off x="5252303" y="3875066"/>
+            <a:ext cx="3113484" cy="210398"/>
+          </a:xfrm>
+          <a:prstGeom prst="rect">
+            <a:avLst/>
+          </a:prstGeom>
+          <a:noFill/>
+          <a:ln>
+            <a:solidFill>
+              <a:srgbClr val="FF0000"/>
+            </a:solidFill>
+          </a:ln>
+        </p:spPr>
+        <p:style>
+          <a:lnRef idx="2">
+            <a:schemeClr val="accent1">
+              <a:shade val="50000"/>
+            </a:schemeClr>
+          </a:lnRef>
+          <a:fillRef idx="1">
+            <a:schemeClr val="accent1"/>
+          </a:fillRef>
+          <a:effectRef idx="0">
+            <a:schemeClr val="accent1"/>
+          </a:effectRef>
+          <a:fontRef idx="minor">
+            <a:schemeClr val="lt1"/>
+          </a:fontRef>
+        </p:style>
+        <p:txBody>
+          <a:bodyPr rtlCol="0" anchor="ctr"/>
+          <a:lstStyle/>
+          <a:p>
+            <a:pPr algn="ctr"/>
+            <a:endParaRPr lang="fr-FR"/>
+          </a:p>
+        </p:txBody>
+      </p:sp>
+    </p:spTree>
+    <p:extLst>
+      <p:ext uri="{BB962C8B-B14F-4D97-AF65-F5344CB8AC3E}">
+        <p14:creationId xmlns:p14="http://schemas.microsoft.com/office/powerpoint/2010/main" val="336542718"/>
+      </p:ext>
+    </p:extLst>
+  </p:cSld>
+  <p:clrMapOvr>
+    <a:masterClrMapping/>
+  </p:clrMapOvr>
+  <p:timing>
+    <p:tnLst>
+      <p:par>
+        <p:cTn id="1" dur="indefinite" restart="never" nodeType="tmRoot">
+          <p:childTnLst>
+            <p:seq concurrent="1" nextAc="seek">
+              <p:cTn id="2" dur="indefinite" nodeType="mainSeq">
+                <p:childTnLst>
+                  <p:par>
+                    <p:cTn id="3" fill="hold">
+                      <p:stCondLst>
+                        <p:cond delay="indefinite"/>
+                        <p:cond evt="onBegin" delay="0">
+                          <p:tn val="2"/>
+                        </p:cond>
+                      </p:stCondLst>
+                      <p:childTnLst>
+                        <p:par>
+                          <p:cTn id="4" fill="hold">
+                            <p:stCondLst>
+                              <p:cond delay="0"/>
+                            </p:stCondLst>
+                            <p:childTnLst>
+                              <p:par>
+                                <p:cTn id="5" presetID="1" presetClass="entr" presetSubtype="0" fill="hold" grpId="0" nodeType="withEffect">
+                                  <p:stCondLst>
+                                    <p:cond delay="0"/>
+                                  </p:stCondLst>
+                                  <p:childTnLst>
+                                    <p:set>
+                                      <p:cBhvr>
+                                        <p:cTn id="6" dur="1" fill="hold">
+                                          <p:stCondLst>
+                                            <p:cond delay="0"/>
+                                          </p:stCondLst>
+                                        </p:cTn>
+                                        <p:tgtEl>
+                                          <p:spTgt spid="12"/>
+                                        </p:tgtEl>
+                                        <p:attrNameLst>
+                                          <p:attrName>style.visibility</p:attrName>
+                                        </p:attrNameLst>
+                                      </p:cBhvr>
+                                      <p:to>
+                                        <p:strVal val="visible"/>
+                                      </p:to>
+                                    </p:set>
+                                  </p:childTnLst>
+                                </p:cTn>
+                              </p:par>
+                            </p:childTnLst>
+                          </p:cTn>
+                        </p:par>
+                      </p:childTnLst>
+                    </p:cTn>
+                  </p:par>
+                  <p:par>
+                    <p:cTn id="7" fill="hold">
+                      <p:stCondLst>
+                        <p:cond delay="indefinite"/>
+                      </p:stCondLst>
+                      <p:childTnLst>
+                        <p:par>
+                          <p:cTn id="8" fill="hold">
+                            <p:stCondLst>
+                              <p:cond delay="0"/>
+                            </p:stCondLst>
+                            <p:childTnLst>
+                              <p:par>
+                                <p:cTn id="9" presetID="1" presetClass="entr" presetSubtype="0" fill="hold" grpId="0" nodeType="clickEffect">
+                                  <p:stCondLst>
+                                    <p:cond delay="0"/>
+                                  </p:stCondLst>
+                                  <p:childTnLst>
+                                    <p:set>
+                                      <p:cBhvr>
+                                        <p:cTn id="10" dur="1" fill="hold">
+                                          <p:stCondLst>
+                                            <p:cond delay="0"/>
+                                          </p:stCondLst>
+                                        </p:cTn>
+                                        <p:tgtEl>
+                                          <p:spTgt spid="11"/>
+                                        </p:tgtEl>
+                                        <p:attrNameLst>
+                                          <p:attrName>style.visibility</p:attrName>
+                                        </p:attrNameLst>
+                                      </p:cBhvr>
+                                      <p:to>
+                                        <p:strVal val="visible"/>
+                                      </p:to>
+                                    </p:set>
+                                  </p:childTnLst>
+                                </p:cTn>
+                              </p:par>
+                            </p:childTnLst>
+                          </p:cTn>
+                        </p:par>
+                      </p:childTnLst>
+                    </p:cTn>
+                  </p:par>
+                  <p:par>
+                    <p:cTn id="11" fill="hold">
+                      <p:stCondLst>
+                        <p:cond delay="indefinite"/>
+                      </p:stCondLst>
+                      <p:childTnLst>
+                        <p:par>
+                          <p:cTn id="12" fill="hold">
+                            <p:stCondLst>
+                              <p:cond delay="0"/>
+                            </p:stCondLst>
+                            <p:childTnLst>
+                              <p:par>
+                                <p:cTn id="13" presetID="1" presetClass="entr" presetSubtype="0" fill="hold" grpId="0" nodeType="clickEffect">
+                                  <p:stCondLst>
+                                    <p:cond delay="0"/>
+                                  </p:stCondLst>
+                                  <p:childTnLst>
+                                    <p:set>
+                                      <p:cBhvr>
+                                        <p:cTn id="14" dur="1" fill="hold">
+                                          <p:stCondLst>
+                                            <p:cond delay="0"/>
+                                          </p:stCondLst>
+                                        </p:cTn>
+                                        <p:tgtEl>
+                                          <p:spTgt spid="7"/>
+                                        </p:tgtEl>
+                                        <p:attrNameLst>
+                                          <p:attrName>style.visibility</p:attrName>
+                                        </p:attrNameLst>
+                                      </p:cBhvr>
+                                      <p:to>
+                                        <p:strVal val="visible"/>
+                                      </p:to>
+                                    </p:set>
+                                  </p:childTnLst>
+                                </p:cTn>
+                              </p:par>
+                            </p:childTnLst>
+                          </p:cTn>
+                        </p:par>
+                      </p:childTnLst>
+                    </p:cTn>
+                  </p:par>
+                </p:childTnLst>
+              </p:cTn>
+              <p:prevCondLst>
+                <p:cond evt="onPrev" delay="0">
+                  <p:tgtEl>
+                    <p:sldTgt/>
+                  </p:tgtEl>
+                </p:cond>
+              </p:prevCondLst>
+              <p:nextCondLst>
+                <p:cond evt="onNext" delay="0">
+                  <p:tgtEl>
+                    <p:sldTgt/>
+                  </p:tgtEl>
+                </p:cond>
+              </p:nextCondLst>
+            </p:seq>
+          </p:childTnLst>
+        </p:cTn>
+      </p:par>
+    </p:tnLst>
+    <p:bldLst>
+      <p:bldP spid="7" grpId="0"/>
+      <p:bldP spid="11" grpId="0" animBg="1"/>
+      <p:bldP spid="12" grpId="0" animBg="1"/>
+    </p:bldLst>
+  </p:timing>
 </p:sld>
 </file>
 

</xml_diff>

<commit_message>
Derniers points avant soutenance; Le main file n'est plus d'actualité)
</commit_message>
<xml_diff>
--- a/Présentation.pptx
+++ b/Présentation.pptx
@@ -232,7 +232,7 @@
           <a:p>
             <a:fld id="{500DDC09-334D-4A7D-989D-E7D77A3D2287}" type="datetimeFigureOut">
               <a:rPr lang="fr-FR" smtClean="0"/>
-              <a:t>01/08/2019</a:t>
+              <a:t>05/08/2019</a:t>
             </a:fld>
             <a:endParaRPr lang="fr-FR"/>
           </a:p>
@@ -543,46 +543,7 @@
           <a:bodyPr/>
           <a:lstStyle/>
           <a:p>
-            <a:r>
-              <a:rPr lang="fr-FR" dirty="0"/>
-              <a:t>Présentation du jeu de données et analyses : 5min</a:t>
-            </a:r>
-          </a:p>
-          <a:p>
-            <a:r>
-              <a:rPr lang="fr-FR" dirty="0"/>
-              <a:t>ACP : 10min</a:t>
-            </a:r>
-          </a:p>
-          <a:p>
-            <a:r>
-              <a:rPr lang="fr-FR" dirty="0"/>
-              <a:t>K-</a:t>
-            </a:r>
-            <a:r>
-              <a:rPr lang="fr-FR" dirty="0" err="1"/>
-              <a:t>means</a:t>
-            </a:r>
-            <a:r>
-              <a:rPr lang="fr-FR" dirty="0"/>
-              <a:t> : 5min</a:t>
-            </a:r>
-          </a:p>
-          <a:p>
-            <a:r>
-              <a:rPr lang="fr-FR" dirty="0"/>
-              <a:t>Modélisation : 5min</a:t>
-            </a:r>
-            <a:br>
-              <a:rPr lang="fr-FR" dirty="0"/>
-            </a:br>
-            <a:br>
-              <a:rPr lang="fr-FR" dirty="0"/>
-            </a:br>
-            <a:r>
-              <a:rPr lang="fr-FR" dirty="0"/>
-              <a:t>Total : 25min</a:t>
-            </a:r>
+            <a:endParaRPr lang="fr-FR" dirty="0"/>
           </a:p>
         </p:txBody>
       </p:sp>
@@ -1788,7 +1749,7 @@
           <a:p>
             <a:r>
               <a:rPr lang="fr-FR" dirty="0"/>
-              <a:t>On obtient à la fin une distribution conditionnelle sous forme de tableau de x lignes et x colonnes (x étant le nombre de quantiles indiqué en début de fonction)</a:t>
+              <a:t>On obtient à la fin une distribution conditionnelle sous forme de matrice de x lignes et x colonnes (x étant le nombre de quantiles indiqué en début de fonction)</a:t>
             </a:r>
           </a:p>
           <a:p>
@@ -2377,7 +2338,7 @@
             </a:br>
             <a:r>
               <a:rPr lang="fr-FR" dirty="0"/>
-              <a:t>Ici la fonction prend 23min.</a:t>
+              <a:t>Ici la fonction prend 5min.</a:t>
             </a:r>
           </a:p>
           <a:p>
@@ -2949,7 +2910,7 @@
           <a:p>
             <a:r>
               <a:rPr lang="fr-FR" dirty="0"/>
-              <a:t>Ici, la boucle prend 10minutes pour s’effectuer.</a:t>
+              <a:t>Ici, la boucle prend 4minutes pour s’effectuer.</a:t>
             </a:r>
           </a:p>
           <a:p>
@@ -3507,7 +3468,19 @@
           <a:p>
             <a:r>
               <a:rPr lang="fr-FR" dirty="0"/>
-              <a:t>On voit sur cette régression que l'indice de Gini n'est pas significatif, on peut donc l'enlever</a:t>
+              <a:t>On voit sur cette régression que l'indice de Gini n'est pas significatif </a:t>
+            </a:r>
+          </a:p>
+          <a:p>
+            <a:r>
+              <a:rPr lang="fr-FR" dirty="0"/>
+              <a:t>[CLICK]</a:t>
+            </a:r>
+          </a:p>
+          <a:p>
+            <a:r>
+              <a:rPr lang="fr-FR" dirty="0"/>
+              <a:t>On peut donc l'enlever</a:t>
             </a:r>
           </a:p>
         </p:txBody>
@@ -3594,7 +3567,13 @@
           <a:p>
             <a:r>
               <a:rPr lang="fr-FR" dirty="0"/>
-              <a:t>Le paramètre est ici significatif, et on obtient un R-</a:t>
+              <a:t>Le paramètre est ici significatif [CLICK]</a:t>
+            </a:r>
+          </a:p>
+          <a:p>
+            <a:r>
+              <a:rPr lang="fr-FR" dirty="0"/>
+              <a:t>On obtient un R-</a:t>
             </a:r>
             <a:r>
               <a:rPr lang="fr-FR" dirty="0" err="1"/>
@@ -3608,6 +3587,15 @@
           <a:p>
             <a:r>
               <a:rPr lang="fr-FR" dirty="0"/>
+              <a:t>[CLICK]</a:t>
+            </a:r>
+          </a:p>
+          <a:p>
+            <a:endParaRPr lang="fr-FR" dirty="0"/>
+          </a:p>
+          <a:p>
+            <a:r>
+              <a:rPr lang="fr-FR" dirty="0"/>
               <a:t>R² = SCE/SCT ; </a:t>
             </a:r>
           </a:p>
@@ -3622,9 +3610,6 @@
               <a:rPr lang="fr-FR" dirty="0"/>
               <a:t>Et pour les autres facteurs, on a 1-0.445 = 0.555 </a:t>
             </a:r>
-          </a:p>
-          <a:p>
-            <a:endParaRPr lang="fr-FR" dirty="0"/>
           </a:p>
         </p:txBody>
       </p:sp>
@@ -3726,7 +3711,19 @@
             </a:r>
             <a:r>
               <a:rPr lang="fr-FR" dirty="0"/>
-              <a:t> on obtient deux paramètres significatifs, cependant, on peut voir que le R-</a:t>
+              <a:t> on obtient deux paramètres significatifs</a:t>
+            </a:r>
+          </a:p>
+          <a:p>
+            <a:r>
+              <a:rPr lang="fr-FR" dirty="0"/>
+              <a:t>[CLICK]</a:t>
+            </a:r>
+          </a:p>
+          <a:p>
+            <a:r>
+              <a:rPr lang="fr-FR" dirty="0"/>
+              <a:t>Cependant, on peut voir que le R-</a:t>
             </a:r>
             <a:r>
               <a:rPr lang="fr-FR" dirty="0" err="1"/>
@@ -3738,12 +3735,18 @@
             </a:r>
           </a:p>
           <a:p>
+            <a:r>
+              <a:rPr lang="fr-FR" dirty="0"/>
+              <a:t>[CLICK]</a:t>
+            </a:r>
+          </a:p>
+          <a:p>
             <a:endParaRPr lang="fr-FR" dirty="0"/>
           </a:p>
           <a:p>
             <a:r>
               <a:rPr lang="fr-FR" dirty="0"/>
-              <a:t>On gardera tout de même ce modèle puisqu'il contient plus de paramètres </a:t>
+              <a:t>On gardera tout de même ce modèle puisqu'il contient le paramètre Gini, utile pour la suite. </a:t>
             </a:r>
           </a:p>
           <a:p>
@@ -3848,7 +3851,19 @@
           <a:p>
             <a:r>
               <a:rPr lang="fr-FR" dirty="0"/>
-              <a:t>Les paramètres sont là aussi significatifs, cependant le R-</a:t>
+              <a:t>Les paramètres sont là aussi significatifs </a:t>
+            </a:r>
+          </a:p>
+          <a:p>
+            <a:r>
+              <a:rPr lang="fr-FR" dirty="0"/>
+              <a:t>[CLICK]</a:t>
+            </a:r>
+          </a:p>
+          <a:p>
+            <a:r>
+              <a:rPr lang="fr-FR" dirty="0"/>
+              <a:t>Cependant le R-</a:t>
             </a:r>
             <a:r>
               <a:rPr lang="fr-FR" dirty="0" err="1"/>
@@ -3856,20 +3871,22 @@
             </a:r>
             <a:r>
               <a:rPr lang="fr-FR" dirty="0"/>
-              <a:t> est inférieur à la reg précédente : 0.389 </a:t>
-            </a:r>
-          </a:p>
-          <a:p>
-            <a:r>
-              <a:rPr lang="fr-FR" dirty="0"/>
-              <a:t>La droite de régression s'écrit donc sous la forme : aX1 + bX2 + cX3 + d ; Soit : </a:t>
-            </a:r>
+              <a:t> est inférieur à la reg précédente : 0.389  </a:t>
+            </a:r>
+          </a:p>
+          <a:p>
+            <a:r>
+              <a:rPr lang="fr-FR" dirty="0"/>
+              <a:t>[CLICK]</a:t>
+            </a:r>
+          </a:p>
+          <a:p>
             <a:br>
               <a:rPr lang="fr-FR" dirty="0"/>
             </a:br>
             <a:r>
               <a:rPr lang="fr-FR" dirty="0"/>
-              <a:t>-58.7538*X1 + 6284.2806*X2 + 64.2410*X3 + (-4.683e+04) </a:t>
+              <a:t>INCOME = -58.7538*X1 + 6284.2806*X2 + 64.2410*X3 + (-4.683e+04) </a:t>
             </a:r>
             <a:br>
               <a:rPr lang="fr-FR" dirty="0"/>
@@ -3916,7 +3933,7 @@
           <a:p>
             <a:r>
               <a:rPr lang="fr-FR" dirty="0"/>
-              <a:t>L'indice de Gini est placé en coefficient négatif, ce qui veut dire que plus l'</a:t>
+              <a:t>L'indice de Gini est placé en coefficient négatif, les autres en positif ; Ce qui veut dire que plus l'</a:t>
             </a:r>
             <a:r>
               <a:rPr lang="fr-FR" dirty="0" err="1"/>
@@ -3924,13 +3941,23 @@
             </a:r>
             <a:r>
               <a:rPr lang="fr-FR" dirty="0"/>
-              <a:t> est grand, plus l'indice est petit, et plus le revenu moyen est grand (logique). </a:t>
-            </a:r>
-          </a:p>
-          <a:p>
-            <a:r>
-              <a:rPr lang="fr-FR" dirty="0"/>
-              <a:t>On peut donc en conclure que plus on va dans un pays inégalitaire, plus l'indice est petit, et plus l'</a:t>
+              <a:t> est </a:t>
+            </a:r>
+            <a:r>
+              <a:rPr lang="fr-FR" dirty="0" err="1"/>
+              <a:t>grand,plus</a:t>
+            </a:r>
+            <a:r>
+              <a:rPr lang="fr-FR" dirty="0"/>
+              <a:t> le </a:t>
+            </a:r>
+            <a:r>
+              <a:rPr lang="fr-FR" dirty="0" err="1"/>
+              <a:t>mean</a:t>
+            </a:r>
+            <a:r>
+              <a:rPr lang="fr-FR" dirty="0"/>
+              <a:t> </a:t>
             </a:r>
             <a:r>
               <a:rPr lang="fr-FR" dirty="0" err="1"/>
@@ -3938,8 +3965,36 @@
             </a:r>
             <a:r>
               <a:rPr lang="fr-FR" dirty="0"/>
-              <a:t> est grand ; Un pays inégalitaire ne favorise donc pas plus de personne qu'il n'en défavorise </a:t>
-            </a:r>
+              <a:t> est grand (logique), et plus l'indice est petit.</a:t>
+            </a:r>
+          </a:p>
+          <a:p>
+            <a:endParaRPr lang="fr-FR" dirty="0"/>
+          </a:p>
+          <a:p>
+            <a:r>
+              <a:rPr lang="fr-FR" dirty="0"/>
+              <a:t>On peut donc en conclure que plus on va dans un pays inégalitaire, plus l'indice est grand, et plus l'</a:t>
+            </a:r>
+            <a:r>
+              <a:rPr lang="fr-FR" dirty="0" err="1"/>
+              <a:t>income</a:t>
+            </a:r>
+            <a:r>
+              <a:rPr lang="fr-FR" dirty="0"/>
+              <a:t> et le </a:t>
+            </a:r>
+            <a:r>
+              <a:rPr lang="fr-FR" dirty="0" err="1"/>
+              <a:t>mean_income</a:t>
+            </a:r>
+            <a:r>
+              <a:rPr lang="fr-FR" dirty="0"/>
+              <a:t> sont petits ; Un pays inégalitaire ne favorise donc pas plus de personne qu'il n'en défavorise </a:t>
+            </a:r>
+          </a:p>
+          <a:p>
+            <a:endParaRPr lang="fr-FR" dirty="0"/>
           </a:p>
           <a:p>
             <a:r>
@@ -4137,8 +4192,23 @@
             </a:r>
             <a:r>
               <a:rPr lang="fr-FR" dirty="0"/>
-              <a:t> value est en dessous de la statistique ; Les résidus suivent donc bien une loi normal</a:t>
-            </a:r>
+              <a:t> value [CLICK] est en dessous de la statistique [CLICK] ; Les résidus suivent donc bien une loi normal [CLICK]</a:t>
+            </a:r>
+          </a:p>
+          <a:p>
+            <a:endParaRPr lang="fr-FR" dirty="0"/>
+          </a:p>
+          <a:p>
+            <a:r>
+              <a:rPr lang="fr-FR" dirty="0"/>
+              <a:t>Le fait que ces résidus suivent une loi normale est très important, cela nous montre que le modèle fit bien les données, et est performant.</a:t>
+            </a:r>
+          </a:p>
+          <a:p>
+            <a:endParaRPr lang="fr-FR" dirty="0"/>
+          </a:p>
+          <a:p>
+            <a:endParaRPr lang="fr-FR" dirty="0"/>
           </a:p>
         </p:txBody>
       </p:sp>
@@ -4977,7 +5047,7 @@
           <a:p>
             <a:fld id="{D6A1C655-8375-4C41-9B67-B1C03E7EEC05}" type="datetimeFigureOut">
               <a:rPr lang="fr-FR" smtClean="0"/>
-              <a:t>01/08/2019</a:t>
+              <a:t>05/08/2019</a:t>
             </a:fld>
             <a:endParaRPr lang="fr-FR"/>
           </a:p>
@@ -5175,7 +5245,7 @@
           <a:p>
             <a:fld id="{D6A1C655-8375-4C41-9B67-B1C03E7EEC05}" type="datetimeFigureOut">
               <a:rPr lang="fr-FR" smtClean="0"/>
-              <a:t>01/08/2019</a:t>
+              <a:t>05/08/2019</a:t>
             </a:fld>
             <a:endParaRPr lang="fr-FR"/>
           </a:p>
@@ -5383,7 +5453,7 @@
           <a:p>
             <a:fld id="{D6A1C655-8375-4C41-9B67-B1C03E7EEC05}" type="datetimeFigureOut">
               <a:rPr lang="fr-FR" smtClean="0"/>
-              <a:t>01/08/2019</a:t>
+              <a:t>05/08/2019</a:t>
             </a:fld>
             <a:endParaRPr lang="fr-FR"/>
           </a:p>
@@ -5581,7 +5651,7 @@
           <a:p>
             <a:fld id="{D6A1C655-8375-4C41-9B67-B1C03E7EEC05}" type="datetimeFigureOut">
               <a:rPr lang="fr-FR" smtClean="0"/>
-              <a:t>01/08/2019</a:t>
+              <a:t>05/08/2019</a:t>
             </a:fld>
             <a:endParaRPr lang="fr-FR"/>
           </a:p>
@@ -5856,7 +5926,7 @@
           <a:p>
             <a:fld id="{D6A1C655-8375-4C41-9B67-B1C03E7EEC05}" type="datetimeFigureOut">
               <a:rPr lang="fr-FR" smtClean="0"/>
-              <a:t>01/08/2019</a:t>
+              <a:t>05/08/2019</a:t>
             </a:fld>
             <a:endParaRPr lang="fr-FR"/>
           </a:p>
@@ -6121,7 +6191,7 @@
           <a:p>
             <a:fld id="{D6A1C655-8375-4C41-9B67-B1C03E7EEC05}" type="datetimeFigureOut">
               <a:rPr lang="fr-FR" smtClean="0"/>
-              <a:t>01/08/2019</a:t>
+              <a:t>05/08/2019</a:t>
             </a:fld>
             <a:endParaRPr lang="fr-FR"/>
           </a:p>
@@ -6533,7 +6603,7 @@
           <a:p>
             <a:fld id="{D6A1C655-8375-4C41-9B67-B1C03E7EEC05}" type="datetimeFigureOut">
               <a:rPr lang="fr-FR" smtClean="0"/>
-              <a:t>01/08/2019</a:t>
+              <a:t>05/08/2019</a:t>
             </a:fld>
             <a:endParaRPr lang="fr-FR"/>
           </a:p>
@@ -6674,7 +6744,7 @@
           <a:p>
             <a:fld id="{D6A1C655-8375-4C41-9B67-B1C03E7EEC05}" type="datetimeFigureOut">
               <a:rPr lang="fr-FR" smtClean="0"/>
-              <a:t>01/08/2019</a:t>
+              <a:t>05/08/2019</a:t>
             </a:fld>
             <a:endParaRPr lang="fr-FR"/>
           </a:p>
@@ -6787,7 +6857,7 @@
           <a:p>
             <a:fld id="{D6A1C655-8375-4C41-9B67-B1C03E7EEC05}" type="datetimeFigureOut">
               <a:rPr lang="fr-FR" smtClean="0"/>
-              <a:t>01/08/2019</a:t>
+              <a:t>05/08/2019</a:t>
             </a:fld>
             <a:endParaRPr lang="fr-FR"/>
           </a:p>
@@ -7098,7 +7168,7 @@
           <a:p>
             <a:fld id="{D6A1C655-8375-4C41-9B67-B1C03E7EEC05}" type="datetimeFigureOut">
               <a:rPr lang="fr-FR" smtClean="0"/>
-              <a:t>01/08/2019</a:t>
+              <a:t>05/08/2019</a:t>
             </a:fld>
             <a:endParaRPr lang="fr-FR"/>
           </a:p>
@@ -7386,7 +7456,7 @@
           <a:p>
             <a:fld id="{D6A1C655-8375-4C41-9B67-B1C03E7EEC05}" type="datetimeFigureOut">
               <a:rPr lang="fr-FR" smtClean="0"/>
-              <a:t>01/08/2019</a:t>
+              <a:t>05/08/2019</a:t>
             </a:fld>
             <a:endParaRPr lang="fr-FR"/>
           </a:p>
@@ -7627,7 +7697,7 @@
           <a:p>
             <a:fld id="{D6A1C655-8375-4C41-9B67-B1C03E7EEC05}" type="datetimeFigureOut">
               <a:rPr lang="fr-FR" smtClean="0"/>
-              <a:t>01/08/2019</a:t>
+              <a:t>05/08/2019</a:t>
             </a:fld>
             <a:endParaRPr lang="fr-FR"/>
           </a:p>
@@ -8995,6 +9065,33 @@
               </a:rPr>
               <a:t>Mission 3 : </a:t>
             </a:r>
+            <a:r>
+              <a:rPr lang="fr-FR" sz="6000" dirty="0">
+                <a:solidFill>
+                  <a:schemeClr val="bg1"/>
+                </a:solidFill>
+              </a:rPr>
+              <a:t>Mise en place du </a:t>
+            </a:r>
+            <a:r>
+              <a:rPr lang="fr-FR" sz="6000" dirty="0" err="1">
+                <a:solidFill>
+                  <a:schemeClr val="bg1"/>
+                </a:solidFill>
+              </a:rPr>
+              <a:t>C_i_parent</a:t>
+            </a:r>
+            <a:r>
+              <a:rPr lang="en-US" sz="6000" kern="1200" dirty="0">
+                <a:solidFill>
+                  <a:schemeClr val="bg1"/>
+                </a:solidFill>
+                <a:latin typeface="+mj-lt"/>
+                <a:ea typeface="+mj-ea"/>
+                <a:cs typeface="+mj-cs"/>
+              </a:rPr>
+              <a:t> </a:t>
+            </a:r>
           </a:p>
         </p:txBody>
       </p:sp>
@@ -11275,45 +11372,6 @@
           </a:prstGeom>
         </p:spPr>
       </p:pic>
-      <p:sp>
-        <p:nvSpPr>
-          <p:cNvPr id="12" name="ZoneTexte 11">
-            <a:extLst>
-              <a:ext uri="{FF2B5EF4-FFF2-40B4-BE49-F238E27FC236}">
-                <a16:creationId xmlns:a16="http://schemas.microsoft.com/office/drawing/2014/main" id="{459C729E-85EC-4B31-BF95-9AAACFE8CBBF}"/>
-              </a:ext>
-            </a:extLst>
-          </p:cNvPr>
-          <p:cNvSpPr txBox="1"/>
-          <p:nvPr/>
-        </p:nvSpPr>
-        <p:spPr>
-          <a:xfrm>
-            <a:off x="311285" y="0"/>
-            <a:ext cx="505267" cy="923330"/>
-          </a:xfrm>
-          <a:prstGeom prst="rect">
-            <a:avLst/>
-          </a:prstGeom>
-          <a:noFill/>
-        </p:spPr>
-        <p:txBody>
-          <a:bodyPr wrap="none" rtlCol="0">
-            <a:spAutoFit/>
-          </a:bodyPr>
-          <a:lstStyle/>
-          <a:p>
-            <a:r>
-              <a:rPr lang="fr-FR" sz="5400" b="1" dirty="0">
-                <a:solidFill>
-                  <a:srgbClr val="FF0000"/>
-                </a:solidFill>
-              </a:rPr>
-              <a:t>?</a:t>
-            </a:r>
-          </a:p>
-        </p:txBody>
-      </p:sp>
     </p:spTree>
     <p:extLst>
       <p:ext uri="{BB962C8B-B14F-4D97-AF65-F5344CB8AC3E}">
@@ -11324,6 +11382,126 @@
   <p:clrMapOvr>
     <a:masterClrMapping/>
   </p:clrMapOvr>
+  <p:timing>
+    <p:tnLst>
+      <p:par>
+        <p:cTn id="1" dur="indefinite" restart="never" nodeType="tmRoot">
+          <p:childTnLst>
+            <p:seq concurrent="1" nextAc="seek">
+              <p:cTn id="2" dur="indefinite" nodeType="mainSeq">
+                <p:childTnLst>
+                  <p:par>
+                    <p:cTn id="3" fill="hold">
+                      <p:stCondLst>
+                        <p:cond delay="indefinite"/>
+                      </p:stCondLst>
+                      <p:childTnLst>
+                        <p:par>
+                          <p:cTn id="4" fill="hold">
+                            <p:stCondLst>
+                              <p:cond delay="0"/>
+                            </p:stCondLst>
+                            <p:childTnLst>
+                              <p:par>
+                                <p:cTn id="5" presetID="1" presetClass="entr" presetSubtype="0" fill="hold" nodeType="clickEffect">
+                                  <p:stCondLst>
+                                    <p:cond delay="0"/>
+                                  </p:stCondLst>
+                                  <p:childTnLst>
+                                    <p:set>
+                                      <p:cBhvr>
+                                        <p:cTn id="6" dur="1" fill="hold">
+                                          <p:stCondLst>
+                                            <p:cond delay="0"/>
+                                          </p:stCondLst>
+                                        </p:cTn>
+                                        <p:tgtEl>
+                                          <p:spTgt spid="10"/>
+                                        </p:tgtEl>
+                                        <p:attrNameLst>
+                                          <p:attrName>style.visibility</p:attrName>
+                                        </p:attrNameLst>
+                                      </p:cBhvr>
+                                      <p:to>
+                                        <p:strVal val="visible"/>
+                                      </p:to>
+                                    </p:set>
+                                  </p:childTnLst>
+                                </p:cTn>
+                              </p:par>
+                            </p:childTnLst>
+                          </p:cTn>
+                        </p:par>
+                      </p:childTnLst>
+                    </p:cTn>
+                  </p:par>
+                  <p:par>
+                    <p:cTn id="7" fill="hold">
+                      <p:stCondLst>
+                        <p:cond delay="indefinite"/>
+                      </p:stCondLst>
+                      <p:childTnLst>
+                        <p:par>
+                          <p:cTn id="8" fill="hold">
+                            <p:stCondLst>
+                              <p:cond delay="0"/>
+                            </p:stCondLst>
+                            <p:childTnLst>
+                              <p:par>
+                                <p:cTn id="9" presetID="1" presetClass="entr" presetSubtype="0" fill="hold" nodeType="clickEffect">
+                                  <p:stCondLst>
+                                    <p:cond delay="0"/>
+                                  </p:stCondLst>
+                                  <p:childTnLst>
+                                    <p:set>
+                                      <p:cBhvr>
+                                        <p:cTn id="10" dur="1" fill="hold">
+                                          <p:stCondLst>
+                                            <p:cond delay="0"/>
+                                          </p:stCondLst>
+                                        </p:cTn>
+                                        <p:tgtEl>
+                                          <p:spTgt spid="11"/>
+                                        </p:tgtEl>
+                                        <p:attrNameLst>
+                                          <p:attrName>style.visibility</p:attrName>
+                                        </p:attrNameLst>
+                                      </p:cBhvr>
+                                      <p:to>
+                                        <p:strVal val="visible"/>
+                                      </p:to>
+                                    </p:set>
+                                  </p:childTnLst>
+                                </p:cTn>
+                              </p:par>
+                            </p:childTnLst>
+                          </p:cTn>
+                        </p:par>
+                      </p:childTnLst>
+                    </p:cTn>
+                  </p:par>
+                </p:childTnLst>
+              </p:cTn>
+              <p:prevCondLst>
+                <p:cond evt="onPrev" delay="0">
+                  <p:tgtEl>
+                    <p:sldTgt/>
+                  </p:tgtEl>
+                </p:cond>
+              </p:prevCondLst>
+              <p:nextCondLst>
+                <p:cond evt="onNext" delay="0">
+                  <p:tgtEl>
+                    <p:sldTgt/>
+                  </p:tgtEl>
+                </p:cond>
+              </p:nextCondLst>
+            </p:seq>
+          </p:childTnLst>
+        </p:cTn>
+      </p:par>
+    </p:tnLst>
+  </p:timing>
 </p:sld>
 </file>
 
@@ -11430,7 +11608,23 @@
             </a:pPr>
             <a:r>
               <a:rPr lang="en-US" dirty="0"/>
-              <a:t>Mission 1 : </a:t>
+              <a:t>Mission 1 : Analyses des </a:t>
+            </a:r>
+            <a:r>
+              <a:rPr lang="en-US" dirty="0" err="1"/>
+              <a:t>données</a:t>
+            </a:r>
+            <a:r>
+              <a:rPr lang="en-US" dirty="0"/>
+              <a:t> </a:t>
+            </a:r>
+            <a:r>
+              <a:rPr lang="en-US" dirty="0" err="1"/>
+              <a:t>utilisées</a:t>
+            </a:r>
+            <a:r>
+              <a:rPr lang="en-US" dirty="0"/>
+              <a:t> </a:t>
             </a:r>
           </a:p>
           <a:p>
@@ -11446,7 +11640,7 @@
             </a:pPr>
             <a:r>
               <a:rPr lang="en-US" dirty="0"/>
-              <a:t>Mission 2 :  </a:t>
+              <a:t>Mission 2 : Zoom sur 5 Pays</a:t>
             </a:r>
           </a:p>
           <a:p>
@@ -11462,8 +11656,21 @@
             </a:pPr>
             <a:r>
               <a:rPr lang="en-US" dirty="0"/>
-              <a:t>Mission 3 :  </a:t>
-            </a:r>
+              <a:t>Mission 3 : Mise </a:t>
+            </a:r>
+            <a:r>
+              <a:rPr lang="en-US" dirty="0" err="1"/>
+              <a:t>en</a:t>
+            </a:r>
+            <a:r>
+              <a:rPr lang="en-US" dirty="0"/>
+              <a:t> place du </a:t>
+            </a:r>
+            <a:r>
+              <a:rPr lang="en-US" dirty="0" err="1"/>
+              <a:t>C_i_parent</a:t>
+            </a:r>
+            <a:endParaRPr lang="en-US" dirty="0"/>
           </a:p>
           <a:p>
             <a:pPr marL="457200" indent="-228600">
@@ -11478,8 +11685,21 @@
             </a:pPr>
             <a:r>
               <a:rPr lang="en-US" dirty="0"/>
-              <a:t>Mission 4 :  </a:t>
-            </a:r>
+              <a:t>Mission 4 : ANOVA et </a:t>
+            </a:r>
+            <a:r>
+              <a:rPr lang="en-US" dirty="0" err="1"/>
+              <a:t>Régressions</a:t>
+            </a:r>
+            <a:r>
+              <a:rPr lang="en-US" dirty="0"/>
+              <a:t> </a:t>
+            </a:r>
+            <a:r>
+              <a:rPr lang="en-US" dirty="0" err="1"/>
+              <a:t>linéaires</a:t>
+            </a:r>
+            <a:endParaRPr lang="en-US" dirty="0"/>
           </a:p>
         </p:txBody>
       </p:sp>
@@ -12915,10 +13135,10 @@
       </p:pic>
       <p:pic>
         <p:nvPicPr>
-          <p:cNvPr id="3" name="Image 2">
-            <a:extLst>
-              <a:ext uri="{FF2B5EF4-FFF2-40B4-BE49-F238E27FC236}">
-                <a16:creationId xmlns:a16="http://schemas.microsoft.com/office/drawing/2014/main" id="{41BD7F75-FAB1-4F7F-8E13-97ECF4E96973}"/>
+          <p:cNvPr id="6" name="Image 5">
+            <a:extLst>
+              <a:ext uri="{FF2B5EF4-FFF2-40B4-BE49-F238E27FC236}">
+                <a16:creationId xmlns:a16="http://schemas.microsoft.com/office/drawing/2014/main" id="{231460D7-C205-4F65-AEE7-4DFAFC530F19}"/>
               </a:ext>
             </a:extLst>
           </p:cNvPr>
@@ -12935,8 +13155,8 @@
         </p:blipFill>
         <p:spPr>
           <a:xfrm>
-            <a:off x="2209800" y="1428750"/>
-            <a:ext cx="7772400" cy="4000500"/>
+            <a:off x="2471098" y="1599020"/>
+            <a:ext cx="7249803" cy="3659959"/>
           </a:xfrm>
           <a:prstGeom prst="rect">
             <a:avLst/>
@@ -12945,10 +13165,10 @@
       </p:pic>
       <p:pic>
         <p:nvPicPr>
-          <p:cNvPr id="5" name="Image 4">
-            <a:extLst>
-              <a:ext uri="{FF2B5EF4-FFF2-40B4-BE49-F238E27FC236}">
-                <a16:creationId xmlns:a16="http://schemas.microsoft.com/office/drawing/2014/main" id="{1D7154F2-2DB0-4983-93BF-CCA920902B42}"/>
+          <p:cNvPr id="8" name="Image 7">
+            <a:extLst>
+              <a:ext uri="{FF2B5EF4-FFF2-40B4-BE49-F238E27FC236}">
+                <a16:creationId xmlns:a16="http://schemas.microsoft.com/office/drawing/2014/main" id="{E80969A1-2BAF-4DB5-BA83-CA83A3B0E853}"/>
               </a:ext>
             </a:extLst>
           </p:cNvPr>
@@ -12965,8 +13185,8 @@
         </p:blipFill>
         <p:spPr>
           <a:xfrm>
-            <a:off x="3343275" y="5784850"/>
-            <a:ext cx="5505450" cy="361950"/>
+            <a:off x="3021540" y="5435600"/>
+            <a:ext cx="6148918" cy="441635"/>
           </a:xfrm>
           <a:prstGeom prst="rect">
             <a:avLst/>
@@ -12983,81 +13203,6 @@
   <p:clrMapOvr>
     <a:masterClrMapping/>
   </p:clrMapOvr>
-  <p:timing>
-    <p:tnLst>
-      <p:par>
-        <p:cTn id="1" dur="indefinite" restart="never" nodeType="tmRoot">
-          <p:childTnLst>
-            <p:seq concurrent="1" nextAc="seek">
-              <p:cTn id="2" dur="indefinite" nodeType="mainSeq">
-                <p:childTnLst>
-                  <p:par>
-                    <p:cTn id="3" fill="hold">
-                      <p:stCondLst>
-                        <p:cond delay="indefinite"/>
-                      </p:stCondLst>
-                      <p:childTnLst>
-                        <p:par>
-                          <p:cTn id="4" fill="hold">
-                            <p:stCondLst>
-                              <p:cond delay="0"/>
-                            </p:stCondLst>
-                            <p:childTnLst>
-                              <p:par>
-                                <p:cTn id="5" presetID="1" presetClass="entr" presetSubtype="0" fill="hold" nodeType="clickEffect">
-                                  <p:stCondLst>
-                                    <p:cond delay="0"/>
-                                  </p:stCondLst>
-                                  <p:childTnLst>
-                                    <p:set>
-                                      <p:cBhvr>
-                                        <p:cTn id="6" dur="1" fill="hold">
-                                          <p:stCondLst>
-                                            <p:cond delay="0"/>
-                                          </p:stCondLst>
-                                        </p:cTn>
-                                        <p:tgtEl>
-                                          <p:spTgt spid="5"/>
-                                        </p:tgtEl>
-                                        <p:attrNameLst>
-                                          <p:attrName>style.visibility</p:attrName>
-                                        </p:attrNameLst>
-                                      </p:cBhvr>
-                                      <p:to>
-                                        <p:strVal val="visible"/>
-                                      </p:to>
-                                    </p:set>
-                                  </p:childTnLst>
-                                </p:cTn>
-                              </p:par>
-                            </p:childTnLst>
-                          </p:cTn>
-                        </p:par>
-                      </p:childTnLst>
-                    </p:cTn>
-                  </p:par>
-                </p:childTnLst>
-              </p:cTn>
-              <p:prevCondLst>
-                <p:cond evt="onPrev" delay="0">
-                  <p:tgtEl>
-                    <p:sldTgt/>
-                  </p:tgtEl>
-                </p:cond>
-              </p:prevCondLst>
-              <p:nextCondLst>
-                <p:cond evt="onNext" delay="0">
-                  <p:tgtEl>
-                    <p:sldTgt/>
-                  </p:tgtEl>
-                </p:cond>
-              </p:nextCondLst>
-            </p:seq>
-          </p:childTnLst>
-        </p:cTn>
-      </p:par>
-    </p:tnLst>
-  </p:timing>
 </p:sld>
 </file>
 
@@ -13924,7 +14069,7 @@
         </p:spPr>
         <p:txBody>
           <a:bodyPr vert="horz" lIns="91440" tIns="45720" rIns="91440" bIns="45720" rtlCol="0" anchor="b">
-            <a:normAutofit/>
+            <a:normAutofit fontScale="90000"/>
           </a:bodyPr>
           <a:lstStyle/>
           <a:p>
@@ -13937,8 +14082,56 @@
                 <a:ea typeface="+mj-ea"/>
                 <a:cs typeface="+mj-cs"/>
               </a:rPr>
-              <a:t>Mission 4 : </a:t>
-            </a:r>
+              <a:t>Mission 4 </a:t>
+            </a:r>
+            <a:r>
+              <a:rPr lang="en-US" sz="6000" dirty="0">
+                <a:solidFill>
+                  <a:schemeClr val="bg1"/>
+                </a:solidFill>
+              </a:rPr>
+              <a:t>: ANOVA et </a:t>
+            </a:r>
+            <a:r>
+              <a:rPr lang="en-US" sz="6000" dirty="0" err="1">
+                <a:solidFill>
+                  <a:schemeClr val="bg1"/>
+                </a:solidFill>
+              </a:rPr>
+              <a:t>Régressions</a:t>
+            </a:r>
+            <a:r>
+              <a:rPr lang="en-US" sz="6000" dirty="0">
+                <a:solidFill>
+                  <a:schemeClr val="bg1"/>
+                </a:solidFill>
+              </a:rPr>
+              <a:t> </a:t>
+            </a:r>
+            <a:r>
+              <a:rPr lang="en-US" sz="6000" dirty="0" err="1">
+                <a:solidFill>
+                  <a:schemeClr val="bg1"/>
+                </a:solidFill>
+              </a:rPr>
+              <a:t>linéaires</a:t>
+            </a:r>
+            <a:r>
+              <a:rPr lang="en-US" sz="6000" dirty="0">
+                <a:solidFill>
+                  <a:schemeClr val="bg1"/>
+                </a:solidFill>
+              </a:rPr>
+              <a:t> </a:t>
+            </a:r>
+            <a:endParaRPr lang="en-US" sz="6000" kern="1200" dirty="0">
+              <a:solidFill>
+                <a:schemeClr val="bg1"/>
+              </a:solidFill>
+              <a:latin typeface="+mj-lt"/>
+              <a:ea typeface="+mj-ea"/>
+              <a:cs typeface="+mj-cs"/>
+            </a:endParaRPr>
           </a:p>
         </p:txBody>
       </p:sp>
@@ -14784,7 +14977,7 @@
         </p:spPr>
         <p:txBody>
           <a:bodyPr vert="horz" lIns="91440" tIns="45720" rIns="91440" bIns="45720" rtlCol="0" anchor="b">
-            <a:normAutofit/>
+            <a:normAutofit fontScale="90000"/>
           </a:bodyPr>
           <a:lstStyle/>
           <a:p>
@@ -14807,6 +15000,51 @@
               </a:rPr>
               <a:t> : </a:t>
             </a:r>
+            <a:r>
+              <a:rPr lang="en-US" sz="6000" dirty="0">
+                <a:solidFill>
+                  <a:schemeClr val="bg1"/>
+                </a:solidFill>
+              </a:rPr>
+              <a:t>Analyses des </a:t>
+            </a:r>
+            <a:r>
+              <a:rPr lang="en-US" sz="6000" dirty="0" err="1">
+                <a:solidFill>
+                  <a:schemeClr val="bg1"/>
+                </a:solidFill>
+              </a:rPr>
+              <a:t>données</a:t>
+            </a:r>
+            <a:r>
+              <a:rPr lang="en-US" sz="6000" dirty="0">
+                <a:solidFill>
+                  <a:schemeClr val="bg1"/>
+                </a:solidFill>
+              </a:rPr>
+              <a:t> </a:t>
+            </a:r>
+            <a:r>
+              <a:rPr lang="en-US" sz="6000" dirty="0" err="1">
+                <a:solidFill>
+                  <a:schemeClr val="bg1"/>
+                </a:solidFill>
+              </a:rPr>
+              <a:t>utilisées</a:t>
+            </a:r>
+            <a:r>
+              <a:rPr lang="en-US" sz="6000" dirty="0">
+                <a:solidFill>
+                  <a:schemeClr val="bg1"/>
+                </a:solidFill>
+              </a:rPr>
+              <a:t> </a:t>
+            </a:r>
+            <a:endParaRPr lang="en-US" sz="6000" kern="1200" dirty="0">
+              <a:solidFill>
+                <a:schemeClr val="bg1"/>
+              </a:solidFill>
+            </a:endParaRPr>
           </a:p>
         </p:txBody>
       </p:sp>
@@ -15637,6 +15875,84 @@
   <p:clrMapOvr>
     <a:masterClrMapping/>
   </p:clrMapOvr>
+  <p:timing>
+    <p:tnLst>
+      <p:par>
+        <p:cTn id="1" dur="indefinite" restart="never" nodeType="tmRoot">
+          <p:childTnLst>
+            <p:seq concurrent="1" nextAc="seek">
+              <p:cTn id="2" dur="indefinite" nodeType="mainSeq">
+                <p:childTnLst>
+                  <p:par>
+                    <p:cTn id="3" fill="hold">
+                      <p:stCondLst>
+                        <p:cond delay="indefinite"/>
+                      </p:stCondLst>
+                      <p:childTnLst>
+                        <p:par>
+                          <p:cTn id="4" fill="hold">
+                            <p:stCondLst>
+                              <p:cond delay="0"/>
+                            </p:stCondLst>
+                            <p:childTnLst>
+                              <p:par>
+                                <p:cTn id="5" presetID="1" presetClass="entr" presetSubtype="0" fill="hold" grpId="0" nodeType="clickEffect">
+                                  <p:stCondLst>
+                                    <p:cond delay="0"/>
+                                  </p:stCondLst>
+                                  <p:childTnLst>
+                                    <p:set>
+                                      <p:cBhvr>
+                                        <p:cTn id="6" dur="1" fill="hold">
+                                          <p:stCondLst>
+                                            <p:cond delay="0"/>
+                                          </p:stCondLst>
+                                        </p:cTn>
+                                        <p:tgtEl>
+                                          <p:spTgt spid="8"/>
+                                        </p:tgtEl>
+                                        <p:attrNameLst>
+                                          <p:attrName>style.visibility</p:attrName>
+                                        </p:attrNameLst>
+                                      </p:cBhvr>
+                                      <p:to>
+                                        <p:strVal val="visible"/>
+                                      </p:to>
+                                    </p:set>
+                                  </p:childTnLst>
+                                </p:cTn>
+                              </p:par>
+                            </p:childTnLst>
+                          </p:cTn>
+                        </p:par>
+                      </p:childTnLst>
+                    </p:cTn>
+                  </p:par>
+                </p:childTnLst>
+              </p:cTn>
+              <p:prevCondLst>
+                <p:cond evt="onPrev" delay="0">
+                  <p:tgtEl>
+                    <p:sldTgt/>
+                  </p:tgtEl>
+                </p:cond>
+              </p:prevCondLst>
+              <p:nextCondLst>
+                <p:cond evt="onNext" delay="0">
+                  <p:tgtEl>
+                    <p:sldTgt/>
+                  </p:tgtEl>
+                </p:cond>
+              </p:nextCondLst>
+            </p:seq>
+          </p:childTnLst>
+        </p:cTn>
+      </p:par>
+    </p:tnLst>
+    <p:bldLst>
+      <p:bldP spid="8" grpId="0" animBg="1"/>
+    </p:bldLst>
+  </p:timing>
 </p:sld>
 </file>
 
@@ -15693,45 +16009,6 @@
           </a:prstGeom>
         </p:spPr>
       </p:pic>
-      <p:sp>
-        <p:nvSpPr>
-          <p:cNvPr id="3" name="ZoneTexte 2">
-            <a:extLst>
-              <a:ext uri="{FF2B5EF4-FFF2-40B4-BE49-F238E27FC236}">
-                <a16:creationId xmlns:a16="http://schemas.microsoft.com/office/drawing/2014/main" id="{4D1D874D-CB32-4905-B31C-CF0033E1BCEC}"/>
-              </a:ext>
-            </a:extLst>
-          </p:cNvPr>
-          <p:cNvSpPr txBox="1"/>
-          <p:nvPr/>
-        </p:nvSpPr>
-        <p:spPr>
-          <a:xfrm>
-            <a:off x="311285" y="0"/>
-            <a:ext cx="566181" cy="923330"/>
-          </a:xfrm>
-          <a:prstGeom prst="rect">
-            <a:avLst/>
-          </a:prstGeom>
-          <a:noFill/>
-        </p:spPr>
-        <p:txBody>
-          <a:bodyPr wrap="none" rtlCol="0">
-            <a:spAutoFit/>
-          </a:bodyPr>
-          <a:lstStyle/>
-          <a:p>
-            <a:r>
-              <a:rPr lang="fr-FR" sz="5400" b="1" dirty="0">
-                <a:solidFill>
-                  <a:srgbClr val="FF0000"/>
-                </a:solidFill>
-              </a:rPr>
-              <a:t>X</a:t>
-            </a:r>
-          </a:p>
-        </p:txBody>
-      </p:sp>
       <p:sp>
         <p:nvSpPr>
           <p:cNvPr id="5" name="Titre 1">
@@ -15941,6 +16218,130 @@
   <p:clrMapOvr>
     <a:masterClrMapping/>
   </p:clrMapOvr>
+  <p:timing>
+    <p:tnLst>
+      <p:par>
+        <p:cTn id="1" dur="indefinite" restart="never" nodeType="tmRoot">
+          <p:childTnLst>
+            <p:seq concurrent="1" nextAc="seek">
+              <p:cTn id="2" dur="indefinite" nodeType="mainSeq">
+                <p:childTnLst>
+                  <p:par>
+                    <p:cTn id="3" fill="hold">
+                      <p:stCondLst>
+                        <p:cond delay="indefinite"/>
+                      </p:stCondLst>
+                      <p:childTnLst>
+                        <p:par>
+                          <p:cTn id="4" fill="hold">
+                            <p:stCondLst>
+                              <p:cond delay="0"/>
+                            </p:stCondLst>
+                            <p:childTnLst>
+                              <p:par>
+                                <p:cTn id="5" presetID="1" presetClass="entr" presetSubtype="0" fill="hold" grpId="0" nodeType="clickEffect">
+                                  <p:stCondLst>
+                                    <p:cond delay="0"/>
+                                  </p:stCondLst>
+                                  <p:childTnLst>
+                                    <p:set>
+                                      <p:cBhvr>
+                                        <p:cTn id="6" dur="1" fill="hold">
+                                          <p:stCondLst>
+                                            <p:cond delay="0"/>
+                                          </p:stCondLst>
+                                        </p:cTn>
+                                        <p:tgtEl>
+                                          <p:spTgt spid="8"/>
+                                        </p:tgtEl>
+                                        <p:attrNameLst>
+                                          <p:attrName>style.visibility</p:attrName>
+                                        </p:attrNameLst>
+                                      </p:cBhvr>
+                                      <p:to>
+                                        <p:strVal val="visible"/>
+                                      </p:to>
+                                    </p:set>
+                                  </p:childTnLst>
+                                </p:cTn>
+                              </p:par>
+                            </p:childTnLst>
+                          </p:cTn>
+                        </p:par>
+                      </p:childTnLst>
+                    </p:cTn>
+                  </p:par>
+                  <p:par>
+                    <p:cTn id="7" fill="hold">
+                      <p:stCondLst>
+                        <p:cond delay="indefinite"/>
+                      </p:stCondLst>
+                      <p:childTnLst>
+                        <p:par>
+                          <p:cTn id="8" fill="hold">
+                            <p:stCondLst>
+                              <p:cond delay="0"/>
+                            </p:stCondLst>
+                            <p:childTnLst>
+                              <p:par>
+                                <p:cTn id="9" presetID="1" presetClass="entr" presetSubtype="0" fill="hold" grpId="0" nodeType="clickEffect">
+                                  <p:stCondLst>
+                                    <p:cond delay="0"/>
+                                  </p:stCondLst>
+                                  <p:childTnLst>
+                                    <p:set>
+                                      <p:cBhvr>
+                                        <p:cTn id="10" dur="1" fill="hold">
+                                          <p:stCondLst>
+                                            <p:cond delay="0"/>
+                                          </p:stCondLst>
+                                        </p:cTn>
+                                        <p:tgtEl>
+                                          <p:spTgt spid="7"/>
+                                        </p:tgtEl>
+                                        <p:attrNameLst>
+                                          <p:attrName>style.visibility</p:attrName>
+                                        </p:attrNameLst>
+                                      </p:cBhvr>
+                                      <p:to>
+                                        <p:strVal val="visible"/>
+                                      </p:to>
+                                    </p:set>
+                                  </p:childTnLst>
+                                </p:cTn>
+                              </p:par>
+                            </p:childTnLst>
+                          </p:cTn>
+                        </p:par>
+                      </p:childTnLst>
+                    </p:cTn>
+                  </p:par>
+                </p:childTnLst>
+              </p:cTn>
+              <p:prevCondLst>
+                <p:cond evt="onPrev" delay="0">
+                  <p:tgtEl>
+                    <p:sldTgt/>
+                  </p:tgtEl>
+                </p:cond>
+              </p:prevCondLst>
+              <p:nextCondLst>
+                <p:cond evt="onNext" delay="0">
+                  <p:tgtEl>
+                    <p:sldTgt/>
+                  </p:tgtEl>
+                </p:cond>
+              </p:nextCondLst>
+            </p:seq>
+          </p:childTnLst>
+        </p:cTn>
+      </p:par>
+    </p:tnLst>
+    <p:bldLst>
+      <p:bldP spid="7" grpId="0" animBg="1"/>
+      <p:bldP spid="8" grpId="0" animBg="1"/>
+    </p:bldLst>
+  </p:timing>
 </p:sld>
 </file>
 
@@ -15997,45 +16398,6 @@
           </a:prstGeom>
         </p:spPr>
       </p:pic>
-      <p:sp>
-        <p:nvSpPr>
-          <p:cNvPr id="3" name="ZoneTexte 2">
-            <a:extLst>
-              <a:ext uri="{FF2B5EF4-FFF2-40B4-BE49-F238E27FC236}">
-                <a16:creationId xmlns:a16="http://schemas.microsoft.com/office/drawing/2014/main" id="{4D1D874D-CB32-4905-B31C-CF0033E1BCEC}"/>
-              </a:ext>
-            </a:extLst>
-          </p:cNvPr>
-          <p:cNvSpPr txBox="1"/>
-          <p:nvPr/>
-        </p:nvSpPr>
-        <p:spPr>
-          <a:xfrm>
-            <a:off x="311285" y="0"/>
-            <a:ext cx="566181" cy="923330"/>
-          </a:xfrm>
-          <a:prstGeom prst="rect">
-            <a:avLst/>
-          </a:prstGeom>
-          <a:noFill/>
-        </p:spPr>
-        <p:txBody>
-          <a:bodyPr wrap="none" rtlCol="0">
-            <a:spAutoFit/>
-          </a:bodyPr>
-          <a:lstStyle/>
-          <a:p>
-            <a:r>
-              <a:rPr lang="fr-FR" sz="5400" b="1" dirty="0">
-                <a:solidFill>
-                  <a:srgbClr val="FF0000"/>
-                </a:solidFill>
-              </a:rPr>
-              <a:t>X</a:t>
-            </a:r>
-          </a:p>
-        </p:txBody>
-      </p:sp>
       <p:sp>
         <p:nvSpPr>
           <p:cNvPr id="7" name="Titre 1">
@@ -16245,6 +16607,130 @@
   <p:clrMapOvr>
     <a:masterClrMapping/>
   </p:clrMapOvr>
+  <p:timing>
+    <p:tnLst>
+      <p:par>
+        <p:cTn id="1" dur="indefinite" restart="never" nodeType="tmRoot">
+          <p:childTnLst>
+            <p:seq concurrent="1" nextAc="seek">
+              <p:cTn id="2" dur="indefinite" nodeType="mainSeq">
+                <p:childTnLst>
+                  <p:par>
+                    <p:cTn id="3" fill="hold">
+                      <p:stCondLst>
+                        <p:cond delay="indefinite"/>
+                      </p:stCondLst>
+                      <p:childTnLst>
+                        <p:par>
+                          <p:cTn id="4" fill="hold">
+                            <p:stCondLst>
+                              <p:cond delay="0"/>
+                            </p:stCondLst>
+                            <p:childTnLst>
+                              <p:par>
+                                <p:cTn id="5" presetID="1" presetClass="entr" presetSubtype="0" fill="hold" grpId="0" nodeType="clickEffect">
+                                  <p:stCondLst>
+                                    <p:cond delay="0"/>
+                                  </p:stCondLst>
+                                  <p:childTnLst>
+                                    <p:set>
+                                      <p:cBhvr>
+                                        <p:cTn id="6" dur="1" fill="hold">
+                                          <p:stCondLst>
+                                            <p:cond delay="0"/>
+                                          </p:stCondLst>
+                                        </p:cTn>
+                                        <p:tgtEl>
+                                          <p:spTgt spid="10"/>
+                                        </p:tgtEl>
+                                        <p:attrNameLst>
+                                          <p:attrName>style.visibility</p:attrName>
+                                        </p:attrNameLst>
+                                      </p:cBhvr>
+                                      <p:to>
+                                        <p:strVal val="visible"/>
+                                      </p:to>
+                                    </p:set>
+                                  </p:childTnLst>
+                                </p:cTn>
+                              </p:par>
+                            </p:childTnLst>
+                          </p:cTn>
+                        </p:par>
+                      </p:childTnLst>
+                    </p:cTn>
+                  </p:par>
+                  <p:par>
+                    <p:cTn id="7" fill="hold">
+                      <p:stCondLst>
+                        <p:cond delay="indefinite"/>
+                      </p:stCondLst>
+                      <p:childTnLst>
+                        <p:par>
+                          <p:cTn id="8" fill="hold">
+                            <p:stCondLst>
+                              <p:cond delay="0"/>
+                            </p:stCondLst>
+                            <p:childTnLst>
+                              <p:par>
+                                <p:cTn id="9" presetID="1" presetClass="entr" presetSubtype="0" fill="hold" grpId="0" nodeType="clickEffect">
+                                  <p:stCondLst>
+                                    <p:cond delay="0"/>
+                                  </p:stCondLst>
+                                  <p:childTnLst>
+                                    <p:set>
+                                      <p:cBhvr>
+                                        <p:cTn id="10" dur="1" fill="hold">
+                                          <p:stCondLst>
+                                            <p:cond delay="0"/>
+                                          </p:stCondLst>
+                                        </p:cTn>
+                                        <p:tgtEl>
+                                          <p:spTgt spid="11"/>
+                                        </p:tgtEl>
+                                        <p:attrNameLst>
+                                          <p:attrName>style.visibility</p:attrName>
+                                        </p:attrNameLst>
+                                      </p:cBhvr>
+                                      <p:to>
+                                        <p:strVal val="visible"/>
+                                      </p:to>
+                                    </p:set>
+                                  </p:childTnLst>
+                                </p:cTn>
+                              </p:par>
+                            </p:childTnLst>
+                          </p:cTn>
+                        </p:par>
+                      </p:childTnLst>
+                    </p:cTn>
+                  </p:par>
+                </p:childTnLst>
+              </p:cTn>
+              <p:prevCondLst>
+                <p:cond evt="onPrev" delay="0">
+                  <p:tgtEl>
+                    <p:sldTgt/>
+                  </p:tgtEl>
+                </p:cond>
+              </p:prevCondLst>
+              <p:nextCondLst>
+                <p:cond evt="onNext" delay="0">
+                  <p:tgtEl>
+                    <p:sldTgt/>
+                  </p:tgtEl>
+                </p:cond>
+              </p:nextCondLst>
+            </p:seq>
+          </p:childTnLst>
+        </p:cTn>
+      </p:par>
+    </p:tnLst>
+    <p:bldLst>
+      <p:bldP spid="10" grpId="0" animBg="1"/>
+      <p:bldP spid="11" grpId="0" animBg="1"/>
+    </p:bldLst>
+  </p:timing>
 </p:sld>
 </file>
 
@@ -16301,45 +16787,6 @@
           </a:prstGeom>
         </p:spPr>
       </p:pic>
-      <p:sp>
-        <p:nvSpPr>
-          <p:cNvPr id="3" name="ZoneTexte 2">
-            <a:extLst>
-              <a:ext uri="{FF2B5EF4-FFF2-40B4-BE49-F238E27FC236}">
-                <a16:creationId xmlns:a16="http://schemas.microsoft.com/office/drawing/2014/main" id="{4D1D874D-CB32-4905-B31C-CF0033E1BCEC}"/>
-              </a:ext>
-            </a:extLst>
-          </p:cNvPr>
-          <p:cNvSpPr txBox="1"/>
-          <p:nvPr/>
-        </p:nvSpPr>
-        <p:spPr>
-          <a:xfrm>
-            <a:off x="311285" y="0"/>
-            <a:ext cx="566181" cy="923330"/>
-          </a:xfrm>
-          <a:prstGeom prst="rect">
-            <a:avLst/>
-          </a:prstGeom>
-          <a:noFill/>
-        </p:spPr>
-        <p:txBody>
-          <a:bodyPr wrap="none" rtlCol="0">
-            <a:spAutoFit/>
-          </a:bodyPr>
-          <a:lstStyle/>
-          <a:p>
-            <a:r>
-              <a:rPr lang="fr-FR" sz="5400" b="1" dirty="0">
-                <a:solidFill>
-                  <a:srgbClr val="FF0000"/>
-                </a:solidFill>
-              </a:rPr>
-              <a:t>X</a:t>
-            </a:r>
-          </a:p>
-        </p:txBody>
-      </p:sp>
       <p:sp>
         <p:nvSpPr>
           <p:cNvPr id="5" name="Titre 1">
@@ -16549,6 +16996,130 @@
   <p:clrMapOvr>
     <a:masterClrMapping/>
   </p:clrMapOvr>
+  <p:timing>
+    <p:tnLst>
+      <p:par>
+        <p:cTn id="1" dur="indefinite" restart="never" nodeType="tmRoot">
+          <p:childTnLst>
+            <p:seq concurrent="1" nextAc="seek">
+              <p:cTn id="2" dur="indefinite" nodeType="mainSeq">
+                <p:childTnLst>
+                  <p:par>
+                    <p:cTn id="3" fill="hold">
+                      <p:stCondLst>
+                        <p:cond delay="indefinite"/>
+                      </p:stCondLst>
+                      <p:childTnLst>
+                        <p:par>
+                          <p:cTn id="4" fill="hold">
+                            <p:stCondLst>
+                              <p:cond delay="0"/>
+                            </p:stCondLst>
+                            <p:childTnLst>
+                              <p:par>
+                                <p:cTn id="5" presetID="1" presetClass="entr" presetSubtype="0" fill="hold" grpId="0" nodeType="clickEffect">
+                                  <p:stCondLst>
+                                    <p:cond delay="0"/>
+                                  </p:stCondLst>
+                                  <p:childTnLst>
+                                    <p:set>
+                                      <p:cBhvr>
+                                        <p:cTn id="6" dur="1" fill="hold">
+                                          <p:stCondLst>
+                                            <p:cond delay="0"/>
+                                          </p:stCondLst>
+                                        </p:cTn>
+                                        <p:tgtEl>
+                                          <p:spTgt spid="12"/>
+                                        </p:tgtEl>
+                                        <p:attrNameLst>
+                                          <p:attrName>style.visibility</p:attrName>
+                                        </p:attrNameLst>
+                                      </p:cBhvr>
+                                      <p:to>
+                                        <p:strVal val="visible"/>
+                                      </p:to>
+                                    </p:set>
+                                  </p:childTnLst>
+                                </p:cTn>
+                              </p:par>
+                            </p:childTnLst>
+                          </p:cTn>
+                        </p:par>
+                      </p:childTnLst>
+                    </p:cTn>
+                  </p:par>
+                  <p:par>
+                    <p:cTn id="7" fill="hold">
+                      <p:stCondLst>
+                        <p:cond delay="indefinite"/>
+                      </p:stCondLst>
+                      <p:childTnLst>
+                        <p:par>
+                          <p:cTn id="8" fill="hold">
+                            <p:stCondLst>
+                              <p:cond delay="0"/>
+                            </p:stCondLst>
+                            <p:childTnLst>
+                              <p:par>
+                                <p:cTn id="9" presetID="1" presetClass="entr" presetSubtype="0" fill="hold" grpId="0" nodeType="clickEffect">
+                                  <p:stCondLst>
+                                    <p:cond delay="0"/>
+                                  </p:stCondLst>
+                                  <p:childTnLst>
+                                    <p:set>
+                                      <p:cBhvr>
+                                        <p:cTn id="10" dur="1" fill="hold">
+                                          <p:stCondLst>
+                                            <p:cond delay="0"/>
+                                          </p:stCondLst>
+                                        </p:cTn>
+                                        <p:tgtEl>
+                                          <p:spTgt spid="11"/>
+                                        </p:tgtEl>
+                                        <p:attrNameLst>
+                                          <p:attrName>style.visibility</p:attrName>
+                                        </p:attrNameLst>
+                                      </p:cBhvr>
+                                      <p:to>
+                                        <p:strVal val="visible"/>
+                                      </p:to>
+                                    </p:set>
+                                  </p:childTnLst>
+                                </p:cTn>
+                              </p:par>
+                            </p:childTnLst>
+                          </p:cTn>
+                        </p:par>
+                      </p:childTnLst>
+                    </p:cTn>
+                  </p:par>
+                </p:childTnLst>
+              </p:cTn>
+              <p:prevCondLst>
+                <p:cond evt="onPrev" delay="0">
+                  <p:tgtEl>
+                    <p:sldTgt/>
+                  </p:tgtEl>
+                </p:cond>
+              </p:prevCondLst>
+              <p:nextCondLst>
+                <p:cond evt="onNext" delay="0">
+                  <p:tgtEl>
+                    <p:sldTgt/>
+                  </p:tgtEl>
+                </p:cond>
+              </p:nextCondLst>
+            </p:seq>
+          </p:childTnLst>
+        </p:cTn>
+      </p:par>
+    </p:tnLst>
+    <p:bldLst>
+      <p:bldP spid="11" grpId="0" animBg="1"/>
+      <p:bldP spid="12" grpId="0" animBg="1"/>
+    </p:bldLst>
+  </p:timing>
 </p:sld>
 </file>
 
@@ -16605,45 +17176,6 @@
           </a:prstGeom>
         </p:spPr>
       </p:pic>
-      <p:sp>
-        <p:nvSpPr>
-          <p:cNvPr id="3" name="ZoneTexte 2">
-            <a:extLst>
-              <a:ext uri="{FF2B5EF4-FFF2-40B4-BE49-F238E27FC236}">
-                <a16:creationId xmlns:a16="http://schemas.microsoft.com/office/drawing/2014/main" id="{4D1D874D-CB32-4905-B31C-CF0033E1BCEC}"/>
-              </a:ext>
-            </a:extLst>
-          </p:cNvPr>
-          <p:cNvSpPr txBox="1"/>
-          <p:nvPr/>
-        </p:nvSpPr>
-        <p:spPr>
-          <a:xfrm>
-            <a:off x="311285" y="0"/>
-            <a:ext cx="566181" cy="923330"/>
-          </a:xfrm>
-          <a:prstGeom prst="rect">
-            <a:avLst/>
-          </a:prstGeom>
-          <a:noFill/>
-        </p:spPr>
-        <p:txBody>
-          <a:bodyPr wrap="none" rtlCol="0">
-            <a:spAutoFit/>
-          </a:bodyPr>
-          <a:lstStyle/>
-          <a:p>
-            <a:r>
-              <a:rPr lang="fr-FR" sz="5400" b="1" dirty="0">
-                <a:solidFill>
-                  <a:srgbClr val="FF0000"/>
-                </a:solidFill>
-              </a:rPr>
-              <a:t>X</a:t>
-            </a:r>
-          </a:p>
-        </p:txBody>
-      </p:sp>
       <p:sp>
         <p:nvSpPr>
           <p:cNvPr id="5" name="Titre 1">
@@ -16923,45 +17455,6 @@
           </a:prstGeom>
         </p:spPr>
       </p:pic>
-      <p:sp>
-        <p:nvSpPr>
-          <p:cNvPr id="3" name="ZoneTexte 2">
-            <a:extLst>
-              <a:ext uri="{FF2B5EF4-FFF2-40B4-BE49-F238E27FC236}">
-                <a16:creationId xmlns:a16="http://schemas.microsoft.com/office/drawing/2014/main" id="{4D1D874D-CB32-4905-B31C-CF0033E1BCEC}"/>
-              </a:ext>
-            </a:extLst>
-          </p:cNvPr>
-          <p:cNvSpPr txBox="1"/>
-          <p:nvPr/>
-        </p:nvSpPr>
-        <p:spPr>
-          <a:xfrm>
-            <a:off x="311285" y="0"/>
-            <a:ext cx="566181" cy="923330"/>
-          </a:xfrm>
-          <a:prstGeom prst="rect">
-            <a:avLst/>
-          </a:prstGeom>
-          <a:noFill/>
-        </p:spPr>
-        <p:txBody>
-          <a:bodyPr wrap="none" rtlCol="0">
-            <a:spAutoFit/>
-          </a:bodyPr>
-          <a:lstStyle/>
-          <a:p>
-            <a:r>
-              <a:rPr lang="fr-FR" sz="5400" b="1" dirty="0">
-                <a:solidFill>
-                  <a:srgbClr val="FF0000"/>
-                </a:solidFill>
-              </a:rPr>
-              <a:t>X</a:t>
-            </a:r>
-          </a:p>
-        </p:txBody>
-      </p:sp>
       <p:sp>
         <p:nvSpPr>
           <p:cNvPr id="5" name="Titre 1">
@@ -18497,8 +18990,24 @@
                 <a:ea typeface="+mj-ea"/>
                 <a:cs typeface="+mj-cs"/>
               </a:rPr>
-              <a:t>Mission 2 : </a:t>
-            </a:r>
+              <a:t>Mission 2 </a:t>
+            </a:r>
+            <a:r>
+              <a:rPr lang="en-US" sz="6000" dirty="0">
+                <a:solidFill>
+                  <a:schemeClr val="bg1"/>
+                </a:solidFill>
+              </a:rPr>
+              <a:t>: Zoom sur 5 Pays </a:t>
+            </a:r>
+            <a:endParaRPr lang="en-US" sz="6000" kern="1200" dirty="0">
+              <a:solidFill>
+                <a:schemeClr val="bg1"/>
+              </a:solidFill>
+              <a:latin typeface="+mj-lt"/>
+              <a:ea typeface="+mj-ea"/>
+              <a:cs typeface="+mj-cs"/>
+            </a:endParaRPr>
           </a:p>
         </p:txBody>
       </p:sp>

</xml_diff>